<commit_message>
improving organization of plots folders
</commit_message>
<xml_diff>
--- a/plots/Fig1/Fig1_ppt.pptx
+++ b/plots/Fig1/Fig1_ppt.pptx
@@ -5,9 +5,7 @@
     <p:sldMasterId id="2147483720" r:id="rId1"/>
   </p:sldMasterIdLst>
   <p:sldIdLst>
-    <p:sldId id="256" r:id="rId2"/>
-    <p:sldId id="263" r:id="rId3"/>
-    <p:sldId id="264" r:id="rId4"/>
+    <p:sldId id="264" r:id="rId2"/>
   </p:sldIdLst>
   <p:sldSz cx="21599525" cy="14400213"/>
   <p:notesSz cx="6858000" cy="9144000"/>
@@ -245,7 +243,7 @@
           <a:p>
             <a:fld id="{75959157-271F-4399-8FEB-EF56E6D5E496}" type="datetimeFigureOut">
               <a:rPr lang="en-US" smtClean="0"/>
-              <a:t>3/2/2023</a:t>
+              <a:t>3/9/2023</a:t>
             </a:fld>
             <a:endParaRPr lang="en-US"/>
           </a:p>
@@ -415,7 +413,7 @@
           <a:p>
             <a:fld id="{75959157-271F-4399-8FEB-EF56E6D5E496}" type="datetimeFigureOut">
               <a:rPr lang="en-US" smtClean="0"/>
-              <a:t>3/2/2023</a:t>
+              <a:t>3/9/2023</a:t>
             </a:fld>
             <a:endParaRPr lang="en-US"/>
           </a:p>
@@ -595,7 +593,7 @@
           <a:p>
             <a:fld id="{75959157-271F-4399-8FEB-EF56E6D5E496}" type="datetimeFigureOut">
               <a:rPr lang="en-US" smtClean="0"/>
-              <a:t>3/2/2023</a:t>
+              <a:t>3/9/2023</a:t>
             </a:fld>
             <a:endParaRPr lang="en-US"/>
           </a:p>
@@ -765,7 +763,7 @@
           <a:p>
             <a:fld id="{75959157-271F-4399-8FEB-EF56E6D5E496}" type="datetimeFigureOut">
               <a:rPr lang="en-US" smtClean="0"/>
-              <a:t>3/2/2023</a:t>
+              <a:t>3/9/2023</a:t>
             </a:fld>
             <a:endParaRPr lang="en-US"/>
           </a:p>
@@ -1009,7 +1007,7 @@
           <a:p>
             <a:fld id="{75959157-271F-4399-8FEB-EF56E6D5E496}" type="datetimeFigureOut">
               <a:rPr lang="en-US" smtClean="0"/>
-              <a:t>3/2/2023</a:t>
+              <a:t>3/9/2023</a:t>
             </a:fld>
             <a:endParaRPr lang="en-US"/>
           </a:p>
@@ -1241,7 +1239,7 @@
           <a:p>
             <a:fld id="{75959157-271F-4399-8FEB-EF56E6D5E496}" type="datetimeFigureOut">
               <a:rPr lang="en-US" smtClean="0"/>
-              <a:t>3/2/2023</a:t>
+              <a:t>3/9/2023</a:t>
             </a:fld>
             <a:endParaRPr lang="en-US"/>
           </a:p>
@@ -1608,7 +1606,7 @@
           <a:p>
             <a:fld id="{75959157-271F-4399-8FEB-EF56E6D5E496}" type="datetimeFigureOut">
               <a:rPr lang="en-US" smtClean="0"/>
-              <a:t>3/2/2023</a:t>
+              <a:t>3/9/2023</a:t>
             </a:fld>
             <a:endParaRPr lang="en-US"/>
           </a:p>
@@ -1726,7 +1724,7 @@
           <a:p>
             <a:fld id="{75959157-271F-4399-8FEB-EF56E6D5E496}" type="datetimeFigureOut">
               <a:rPr lang="en-US" smtClean="0"/>
-              <a:t>3/2/2023</a:t>
+              <a:t>3/9/2023</a:t>
             </a:fld>
             <a:endParaRPr lang="en-US"/>
           </a:p>
@@ -1821,7 +1819,7 @@
           <a:p>
             <a:fld id="{75959157-271F-4399-8FEB-EF56E6D5E496}" type="datetimeFigureOut">
               <a:rPr lang="en-US" smtClean="0"/>
-              <a:t>3/2/2023</a:t>
+              <a:t>3/9/2023</a:t>
             </a:fld>
             <a:endParaRPr lang="en-US"/>
           </a:p>
@@ -2098,7 +2096,7 @@
           <a:p>
             <a:fld id="{75959157-271F-4399-8FEB-EF56E6D5E496}" type="datetimeFigureOut">
               <a:rPr lang="en-US" smtClean="0"/>
-              <a:t>3/2/2023</a:t>
+              <a:t>3/9/2023</a:t>
             </a:fld>
             <a:endParaRPr lang="en-US"/>
           </a:p>
@@ -2355,7 +2353,7 @@
           <a:p>
             <a:fld id="{75959157-271F-4399-8FEB-EF56E6D5E496}" type="datetimeFigureOut">
               <a:rPr lang="en-US" smtClean="0"/>
-              <a:t>3/2/2023</a:t>
+              <a:t>3/9/2023</a:t>
             </a:fld>
             <a:endParaRPr lang="en-US"/>
           </a:p>
@@ -2568,7 +2566,7 @@
           <a:p>
             <a:fld id="{75959157-271F-4399-8FEB-EF56E6D5E496}" type="datetimeFigureOut">
               <a:rPr lang="en-US" smtClean="0"/>
-              <a:t>3/2/2023</a:t>
+              <a:t>3/9/2023</a:t>
             </a:fld>
             <a:endParaRPr lang="en-US"/>
           </a:p>
@@ -2957,4507 +2955,6 @@
 </file>
 
 <file path=ppt/slides/slide1.xml><?xml version="1.0" encoding="utf-8"?>
-<p:sld xmlns:a="http://schemas.openxmlformats.org/drawingml/2006/main" xmlns:r="http://schemas.openxmlformats.org/officeDocument/2006/relationships" xmlns:p="http://schemas.openxmlformats.org/presentationml/2006/main">
-  <p:cSld>
-    <p:spTree>
-      <p:nvGrpSpPr>
-        <p:cNvPr id="1" name=""/>
-        <p:cNvGrpSpPr/>
-        <p:nvPr/>
-      </p:nvGrpSpPr>
-      <p:grpSpPr>
-        <a:xfrm>
-          <a:off x="0" y="0"/>
-          <a:ext cx="0" cy="0"/>
-          <a:chOff x="0" y="0"/>
-          <a:chExt cx="0" cy="0"/>
-        </a:xfrm>
-      </p:grpSpPr>
-      <p:graphicFrame>
-        <p:nvGraphicFramePr>
-          <p:cNvPr id="5" name="Object 4">
-            <a:extLst>
-              <a:ext uri="{FF2B5EF4-FFF2-40B4-BE49-F238E27FC236}">
-                <a16:creationId xmlns:a16="http://schemas.microsoft.com/office/drawing/2014/main" id="{72BCCD3F-9175-4E77-B787-7116C58C59A5}"/>
-              </a:ext>
-            </a:extLst>
-          </p:cNvPr>
-          <p:cNvGraphicFramePr>
-            <a:graphicFrameLocks noChangeAspect="1"/>
-          </p:cNvGraphicFramePr>
-          <p:nvPr>
-            <p:extLst>
-              <p:ext uri="{D42A27DB-BD31-4B8C-83A1-F6EECF244321}">
-                <p14:modId xmlns:p14="http://schemas.microsoft.com/office/powerpoint/2010/main" val="2828589193"/>
-              </p:ext>
-            </p:extLst>
-          </p:nvPr>
-        </p:nvGraphicFramePr>
-        <p:xfrm>
-          <a:off x="2728905" y="9789983"/>
-          <a:ext cx="15395208" cy="511280"/>
-        </p:xfrm>
-        <a:graphic>
-          <a:graphicData uri="http://schemas.openxmlformats.org/presentationml/2006/ole">
-            <mc:AlternateContent xmlns:mc="http://schemas.openxmlformats.org/markup-compatibility/2006">
-              <mc:Choice xmlns:v="urn:schemas-microsoft-com:vml" Requires="v">
-                <p:oleObj name="Worksheet" r:id="rId2" imgW="10324953" imgH="342900" progId="Excel.Sheet.12">
-                  <p:embed/>
-                </p:oleObj>
-              </mc:Choice>
-              <mc:Fallback>
-                <p:oleObj name="Worksheet" r:id="rId2" imgW="10324953" imgH="342900" progId="Excel.Sheet.12">
-                  <p:embed/>
-                  <p:pic>
-                    <p:nvPicPr>
-                      <p:cNvPr id="0" name=""/>
-                      <p:cNvPicPr/>
-                      <p:nvPr/>
-                    </p:nvPicPr>
-                    <p:blipFill>
-                      <a:blip r:embed="rId3"/>
-                      <a:stretch>
-                        <a:fillRect/>
-                      </a:stretch>
-                    </p:blipFill>
-                    <p:spPr>
-                      <a:xfrm>
-                        <a:off x="2728905" y="9789983"/>
-                        <a:ext cx="15395208" cy="511280"/>
-                      </a:xfrm>
-                      <a:prstGeom prst="rect">
-                        <a:avLst/>
-                      </a:prstGeom>
-                    </p:spPr>
-                  </p:pic>
-                </p:oleObj>
-              </mc:Fallback>
-            </mc:AlternateContent>
-          </a:graphicData>
-        </a:graphic>
-      </p:graphicFrame>
-      <p:grpSp>
-        <p:nvGrpSpPr>
-          <p:cNvPr id="44" name="Group 43">
-            <a:extLst>
-              <a:ext uri="{FF2B5EF4-FFF2-40B4-BE49-F238E27FC236}">
-                <a16:creationId xmlns:a16="http://schemas.microsoft.com/office/drawing/2014/main" id="{2E19D01A-13BA-4D39-B19F-14DF8258F7C9}"/>
-              </a:ext>
-            </a:extLst>
-          </p:cNvPr>
-          <p:cNvGrpSpPr/>
-          <p:nvPr/>
-        </p:nvGrpSpPr>
-        <p:grpSpPr>
-          <a:xfrm>
-            <a:off x="2570710" y="3904577"/>
-            <a:ext cx="16128360" cy="2824104"/>
-            <a:chOff x="520876" y="1459419"/>
-            <a:chExt cx="10816802" cy="1894041"/>
-          </a:xfrm>
-        </p:grpSpPr>
-        <p:pic>
-          <p:nvPicPr>
-            <p:cNvPr id="67" name="Picture 66">
-              <a:extLst>
-                <a:ext uri="{FF2B5EF4-FFF2-40B4-BE49-F238E27FC236}">
-                  <a16:creationId xmlns:a16="http://schemas.microsoft.com/office/drawing/2014/main" id="{A7DB5665-7042-4676-AF10-82712EE9D19A}"/>
-                </a:ext>
-              </a:extLst>
-            </p:cNvPr>
-            <p:cNvPicPr>
-              <a:picLocks noChangeAspect="1"/>
-            </p:cNvPicPr>
-            <p:nvPr/>
-          </p:nvPicPr>
-          <p:blipFill>
-            <a:blip r:embed="rId4"/>
-            <a:stretch>
-              <a:fillRect/>
-            </a:stretch>
-          </p:blipFill>
-          <p:spPr>
-            <a:xfrm>
-              <a:off x="8805524" y="2227278"/>
-              <a:ext cx="658185" cy="651947"/>
-            </a:xfrm>
-            <a:prstGeom prst="rect">
-              <a:avLst/>
-            </a:prstGeom>
-          </p:spPr>
-        </p:pic>
-        <p:cxnSp>
-          <p:nvCxnSpPr>
-            <p:cNvPr id="7" name="Straight Connector 6">
-              <a:extLst>
-                <a:ext uri="{FF2B5EF4-FFF2-40B4-BE49-F238E27FC236}">
-                  <a16:creationId xmlns:a16="http://schemas.microsoft.com/office/drawing/2014/main" id="{DFCBDCC5-DD3D-46BE-AE46-E41F688050C8}"/>
-                </a:ext>
-              </a:extLst>
-            </p:cNvPr>
-            <p:cNvCxnSpPr/>
-            <p:nvPr/>
-          </p:nvCxnSpPr>
-          <p:spPr>
-            <a:xfrm>
-              <a:off x="604587" y="2991853"/>
-              <a:ext cx="10384256" cy="0"/>
-            </a:xfrm>
-            <a:prstGeom prst="line">
-              <a:avLst/>
-            </a:prstGeom>
-            <a:ln w="28575">
-              <a:solidFill>
-                <a:schemeClr val="tx1"/>
-              </a:solidFill>
-            </a:ln>
-          </p:spPr>
-          <p:style>
-            <a:lnRef idx="1">
-              <a:schemeClr val="dk1"/>
-            </a:lnRef>
-            <a:fillRef idx="0">
-              <a:schemeClr val="dk1"/>
-            </a:fillRef>
-            <a:effectRef idx="0">
-              <a:schemeClr val="dk1"/>
-            </a:effectRef>
-            <a:fontRef idx="minor">
-              <a:schemeClr val="tx1"/>
-            </a:fontRef>
-          </p:style>
-        </p:cxnSp>
-        <p:sp>
-          <p:nvSpPr>
-            <p:cNvPr id="8" name="Oval 7">
-              <a:extLst>
-                <a:ext uri="{FF2B5EF4-FFF2-40B4-BE49-F238E27FC236}">
-                  <a16:creationId xmlns:a16="http://schemas.microsoft.com/office/drawing/2014/main" id="{6A0328C6-4BA3-446C-9E12-F8FC64A6301F}"/>
-                </a:ext>
-              </a:extLst>
-            </p:cNvPr>
-            <p:cNvSpPr/>
-            <p:nvPr/>
-          </p:nvSpPr>
-          <p:spPr>
-            <a:xfrm>
-              <a:off x="520876" y="2934704"/>
-              <a:ext cx="2677520" cy="112294"/>
-            </a:xfrm>
-            <a:prstGeom prst="ellipse">
-              <a:avLst/>
-            </a:prstGeom>
-            <a:solidFill>
-              <a:schemeClr val="tx1"/>
-            </a:solidFill>
-            <a:ln>
-              <a:solidFill>
-                <a:schemeClr val="tx1"/>
-              </a:solidFill>
-            </a:ln>
-          </p:spPr>
-          <p:style>
-            <a:lnRef idx="2">
-              <a:schemeClr val="accent1">
-                <a:shade val="50000"/>
-              </a:schemeClr>
-            </a:lnRef>
-            <a:fillRef idx="1">
-              <a:schemeClr val="accent1"/>
-            </a:fillRef>
-            <a:effectRef idx="0">
-              <a:schemeClr val="accent1"/>
-            </a:effectRef>
-            <a:fontRef idx="minor">
-              <a:schemeClr val="lt1"/>
-            </a:fontRef>
-          </p:style>
-          <p:txBody>
-            <a:bodyPr rtlCol="0" anchor="ctr"/>
-            <a:lstStyle/>
-            <a:p>
-              <a:pPr algn="ctr"/>
-              <a:endParaRPr lang="en-US" sz="2942"/>
-            </a:p>
-          </p:txBody>
-        </p:sp>
-        <p:sp>
-          <p:nvSpPr>
-            <p:cNvPr id="9" name="Oval 8">
-              <a:extLst>
-                <a:ext uri="{FF2B5EF4-FFF2-40B4-BE49-F238E27FC236}">
-                  <a16:creationId xmlns:a16="http://schemas.microsoft.com/office/drawing/2014/main" id="{B6E2B30B-17EE-446A-AAC5-2132B4C69130}"/>
-                </a:ext>
-              </a:extLst>
-            </p:cNvPr>
-            <p:cNvSpPr/>
-            <p:nvPr/>
-          </p:nvSpPr>
-          <p:spPr>
-            <a:xfrm>
-              <a:off x="3198396" y="2934704"/>
-              <a:ext cx="104274" cy="112294"/>
-            </a:xfrm>
-            <a:prstGeom prst="ellipse">
-              <a:avLst/>
-            </a:prstGeom>
-            <a:solidFill>
-              <a:schemeClr val="tx1"/>
-            </a:solidFill>
-            <a:ln>
-              <a:solidFill>
-                <a:schemeClr val="tx1"/>
-              </a:solidFill>
-            </a:ln>
-          </p:spPr>
-          <p:style>
-            <a:lnRef idx="2">
-              <a:schemeClr val="accent1">
-                <a:shade val="50000"/>
-              </a:schemeClr>
-            </a:lnRef>
-            <a:fillRef idx="1">
-              <a:schemeClr val="accent1"/>
-            </a:fillRef>
-            <a:effectRef idx="0">
-              <a:schemeClr val="accent1"/>
-            </a:effectRef>
-            <a:fontRef idx="minor">
-              <a:schemeClr val="lt1"/>
-            </a:fontRef>
-          </p:style>
-          <p:txBody>
-            <a:bodyPr rtlCol="0" anchor="ctr"/>
-            <a:lstStyle/>
-            <a:p>
-              <a:pPr algn="ctr"/>
-              <a:endParaRPr lang="en-US" sz="2942"/>
-            </a:p>
-          </p:txBody>
-        </p:sp>
-        <p:sp>
-          <p:nvSpPr>
-            <p:cNvPr id="10" name="Oval 9">
-              <a:extLst>
-                <a:ext uri="{FF2B5EF4-FFF2-40B4-BE49-F238E27FC236}">
-                  <a16:creationId xmlns:a16="http://schemas.microsoft.com/office/drawing/2014/main" id="{6BF65A4F-EE02-4914-AE9A-020D9A347B67}"/>
-                </a:ext>
-              </a:extLst>
-            </p:cNvPr>
-            <p:cNvSpPr/>
-            <p:nvPr/>
-          </p:nvSpPr>
-          <p:spPr>
-            <a:xfrm>
-              <a:off x="3404940" y="2934704"/>
-              <a:ext cx="104274" cy="112294"/>
-            </a:xfrm>
-            <a:prstGeom prst="ellipse">
-              <a:avLst/>
-            </a:prstGeom>
-            <a:solidFill>
-              <a:schemeClr val="tx1"/>
-            </a:solidFill>
-            <a:ln>
-              <a:solidFill>
-                <a:schemeClr val="tx1"/>
-              </a:solidFill>
-            </a:ln>
-          </p:spPr>
-          <p:style>
-            <a:lnRef idx="2">
-              <a:schemeClr val="accent1">
-                <a:shade val="50000"/>
-              </a:schemeClr>
-            </a:lnRef>
-            <a:fillRef idx="1">
-              <a:schemeClr val="accent1"/>
-            </a:fillRef>
-            <a:effectRef idx="0">
-              <a:schemeClr val="accent1"/>
-            </a:effectRef>
-            <a:fontRef idx="minor">
-              <a:schemeClr val="lt1"/>
-            </a:fontRef>
-          </p:style>
-          <p:txBody>
-            <a:bodyPr rtlCol="0" anchor="ctr"/>
-            <a:lstStyle/>
-            <a:p>
-              <a:pPr algn="ctr"/>
-              <a:endParaRPr lang="en-US" sz="2942"/>
-            </a:p>
-          </p:txBody>
-        </p:sp>
-        <p:sp>
-          <p:nvSpPr>
-            <p:cNvPr id="11" name="Oval 10">
-              <a:extLst>
-                <a:ext uri="{FF2B5EF4-FFF2-40B4-BE49-F238E27FC236}">
-                  <a16:creationId xmlns:a16="http://schemas.microsoft.com/office/drawing/2014/main" id="{668BC520-59D3-45B8-AF20-A1177D7D23B2}"/>
-                </a:ext>
-              </a:extLst>
-            </p:cNvPr>
-            <p:cNvSpPr/>
-            <p:nvPr/>
-          </p:nvSpPr>
-          <p:spPr>
-            <a:xfrm>
-              <a:off x="4858754" y="2939716"/>
-              <a:ext cx="104274" cy="112294"/>
-            </a:xfrm>
-            <a:prstGeom prst="ellipse">
-              <a:avLst/>
-            </a:prstGeom>
-            <a:solidFill>
-              <a:schemeClr val="tx1"/>
-            </a:solidFill>
-            <a:ln>
-              <a:solidFill>
-                <a:schemeClr val="tx1"/>
-              </a:solidFill>
-            </a:ln>
-          </p:spPr>
-          <p:style>
-            <a:lnRef idx="2">
-              <a:schemeClr val="accent1">
-                <a:shade val="50000"/>
-              </a:schemeClr>
-            </a:lnRef>
-            <a:fillRef idx="1">
-              <a:schemeClr val="accent1"/>
-            </a:fillRef>
-            <a:effectRef idx="0">
-              <a:schemeClr val="accent1"/>
-            </a:effectRef>
-            <a:fontRef idx="minor">
-              <a:schemeClr val="lt1"/>
-            </a:fontRef>
-          </p:style>
-          <p:txBody>
-            <a:bodyPr rtlCol="0" anchor="ctr"/>
-            <a:lstStyle/>
-            <a:p>
-              <a:pPr algn="ctr"/>
-              <a:endParaRPr lang="en-US" sz="2942"/>
-            </a:p>
-          </p:txBody>
-        </p:sp>
-        <p:sp>
-          <p:nvSpPr>
-            <p:cNvPr id="12" name="Oval 11">
-              <a:extLst>
-                <a:ext uri="{FF2B5EF4-FFF2-40B4-BE49-F238E27FC236}">
-                  <a16:creationId xmlns:a16="http://schemas.microsoft.com/office/drawing/2014/main" id="{B53D6C1D-FCAE-45AF-A36F-D580A4DE219E}"/>
-                </a:ext>
-              </a:extLst>
-            </p:cNvPr>
-            <p:cNvSpPr/>
-            <p:nvPr/>
-          </p:nvSpPr>
-          <p:spPr>
-            <a:xfrm>
-              <a:off x="5388144" y="2934704"/>
-              <a:ext cx="104274" cy="112294"/>
-            </a:xfrm>
-            <a:prstGeom prst="ellipse">
-              <a:avLst/>
-            </a:prstGeom>
-            <a:solidFill>
-              <a:schemeClr val="tx1"/>
-            </a:solidFill>
-            <a:ln>
-              <a:solidFill>
-                <a:schemeClr val="tx1"/>
-              </a:solidFill>
-            </a:ln>
-          </p:spPr>
-          <p:style>
-            <a:lnRef idx="2">
-              <a:schemeClr val="accent1">
-                <a:shade val="50000"/>
-              </a:schemeClr>
-            </a:lnRef>
-            <a:fillRef idx="1">
-              <a:schemeClr val="accent1"/>
-            </a:fillRef>
-            <a:effectRef idx="0">
-              <a:schemeClr val="accent1"/>
-            </a:effectRef>
-            <a:fontRef idx="minor">
-              <a:schemeClr val="lt1"/>
-            </a:fontRef>
-          </p:style>
-          <p:txBody>
-            <a:bodyPr rtlCol="0" anchor="ctr"/>
-            <a:lstStyle/>
-            <a:p>
-              <a:pPr algn="ctr"/>
-              <a:endParaRPr lang="en-US" sz="2942"/>
-            </a:p>
-          </p:txBody>
-        </p:sp>
-        <p:sp>
-          <p:nvSpPr>
-            <p:cNvPr id="13" name="Oval 12">
-              <a:extLst>
-                <a:ext uri="{FF2B5EF4-FFF2-40B4-BE49-F238E27FC236}">
-                  <a16:creationId xmlns:a16="http://schemas.microsoft.com/office/drawing/2014/main" id="{57FE6760-9852-44E6-AB31-232A1CE1100B}"/>
-                </a:ext>
-              </a:extLst>
-            </p:cNvPr>
-            <p:cNvSpPr/>
-            <p:nvPr/>
-          </p:nvSpPr>
-          <p:spPr>
-            <a:xfrm>
-              <a:off x="6300540" y="2939716"/>
-              <a:ext cx="104274" cy="112294"/>
-            </a:xfrm>
-            <a:prstGeom prst="ellipse">
-              <a:avLst/>
-            </a:prstGeom>
-            <a:solidFill>
-              <a:schemeClr val="tx1"/>
-            </a:solidFill>
-            <a:ln>
-              <a:solidFill>
-                <a:schemeClr val="tx1"/>
-              </a:solidFill>
-            </a:ln>
-          </p:spPr>
-          <p:style>
-            <a:lnRef idx="2">
-              <a:schemeClr val="accent1">
-                <a:shade val="50000"/>
-              </a:schemeClr>
-            </a:lnRef>
-            <a:fillRef idx="1">
-              <a:schemeClr val="accent1"/>
-            </a:fillRef>
-            <a:effectRef idx="0">
-              <a:schemeClr val="accent1"/>
-            </a:effectRef>
-            <a:fontRef idx="minor">
-              <a:schemeClr val="lt1"/>
-            </a:fontRef>
-          </p:style>
-          <p:txBody>
-            <a:bodyPr rtlCol="0" anchor="ctr"/>
-            <a:lstStyle/>
-            <a:p>
-              <a:pPr algn="ctr"/>
-              <a:endParaRPr lang="en-US" sz="2942"/>
-            </a:p>
-          </p:txBody>
-        </p:sp>
-        <p:sp>
-          <p:nvSpPr>
-            <p:cNvPr id="14" name="Oval 13">
-              <a:extLst>
-                <a:ext uri="{FF2B5EF4-FFF2-40B4-BE49-F238E27FC236}">
-                  <a16:creationId xmlns:a16="http://schemas.microsoft.com/office/drawing/2014/main" id="{6791E794-3177-4495-9D67-C30A5C2CEDDD}"/>
-                </a:ext>
-              </a:extLst>
-            </p:cNvPr>
-            <p:cNvSpPr/>
-            <p:nvPr/>
-          </p:nvSpPr>
-          <p:spPr>
-            <a:xfrm>
-              <a:off x="7000375" y="2934704"/>
-              <a:ext cx="104274" cy="112294"/>
-            </a:xfrm>
-            <a:prstGeom prst="ellipse">
-              <a:avLst/>
-            </a:prstGeom>
-            <a:solidFill>
-              <a:schemeClr val="tx1"/>
-            </a:solidFill>
-            <a:ln>
-              <a:solidFill>
-                <a:schemeClr val="tx1"/>
-              </a:solidFill>
-            </a:ln>
-          </p:spPr>
-          <p:style>
-            <a:lnRef idx="2">
-              <a:schemeClr val="accent1">
-                <a:shade val="50000"/>
-              </a:schemeClr>
-            </a:lnRef>
-            <a:fillRef idx="1">
-              <a:schemeClr val="accent1"/>
-            </a:fillRef>
-            <a:effectRef idx="0">
-              <a:schemeClr val="accent1"/>
-            </a:effectRef>
-            <a:fontRef idx="minor">
-              <a:schemeClr val="lt1"/>
-            </a:fontRef>
-          </p:style>
-          <p:txBody>
-            <a:bodyPr rtlCol="0" anchor="ctr"/>
-            <a:lstStyle/>
-            <a:p>
-              <a:pPr algn="ctr"/>
-              <a:endParaRPr lang="en-US" sz="2942"/>
-            </a:p>
-          </p:txBody>
-        </p:sp>
-        <p:sp>
-          <p:nvSpPr>
-            <p:cNvPr id="15" name="Oval 14">
-              <a:extLst>
-                <a:ext uri="{FF2B5EF4-FFF2-40B4-BE49-F238E27FC236}">
-                  <a16:creationId xmlns:a16="http://schemas.microsoft.com/office/drawing/2014/main" id="{BAEA3443-39D9-444D-AAB4-2F7175BC2AE8}"/>
-                </a:ext>
-              </a:extLst>
-            </p:cNvPr>
-            <p:cNvSpPr/>
-            <p:nvPr/>
-          </p:nvSpPr>
-          <p:spPr>
-            <a:xfrm>
-              <a:off x="7912771" y="2939716"/>
-              <a:ext cx="104274" cy="112294"/>
-            </a:xfrm>
-            <a:prstGeom prst="ellipse">
-              <a:avLst/>
-            </a:prstGeom>
-            <a:solidFill>
-              <a:schemeClr val="tx1"/>
-            </a:solidFill>
-            <a:ln>
-              <a:solidFill>
-                <a:schemeClr val="tx1"/>
-              </a:solidFill>
-            </a:ln>
-          </p:spPr>
-          <p:style>
-            <a:lnRef idx="2">
-              <a:schemeClr val="accent1">
-                <a:shade val="50000"/>
-              </a:schemeClr>
-            </a:lnRef>
-            <a:fillRef idx="1">
-              <a:schemeClr val="accent1"/>
-            </a:fillRef>
-            <a:effectRef idx="0">
-              <a:schemeClr val="accent1"/>
-            </a:effectRef>
-            <a:fontRef idx="minor">
-              <a:schemeClr val="lt1"/>
-            </a:fontRef>
-          </p:style>
-          <p:txBody>
-            <a:bodyPr rtlCol="0" anchor="ctr"/>
-            <a:lstStyle/>
-            <a:p>
-              <a:pPr algn="ctr"/>
-              <a:endParaRPr lang="en-US" sz="2942"/>
-            </a:p>
-          </p:txBody>
-        </p:sp>
-        <p:sp>
-          <p:nvSpPr>
-            <p:cNvPr id="16" name="Oval 15">
-              <a:extLst>
-                <a:ext uri="{FF2B5EF4-FFF2-40B4-BE49-F238E27FC236}">
-                  <a16:creationId xmlns:a16="http://schemas.microsoft.com/office/drawing/2014/main" id="{11424A3E-B71D-4339-98F2-2365FC05B448}"/>
-                </a:ext>
-              </a:extLst>
-            </p:cNvPr>
-            <p:cNvSpPr/>
-            <p:nvPr/>
-          </p:nvSpPr>
-          <p:spPr>
-            <a:xfrm>
-              <a:off x="9895975" y="2934704"/>
-              <a:ext cx="104274" cy="112294"/>
-            </a:xfrm>
-            <a:prstGeom prst="ellipse">
-              <a:avLst/>
-            </a:prstGeom>
-            <a:solidFill>
-              <a:schemeClr val="tx1"/>
-            </a:solidFill>
-            <a:ln>
-              <a:solidFill>
-                <a:schemeClr val="tx1"/>
-              </a:solidFill>
-            </a:ln>
-          </p:spPr>
-          <p:style>
-            <a:lnRef idx="2">
-              <a:schemeClr val="accent1">
-                <a:shade val="50000"/>
-              </a:schemeClr>
-            </a:lnRef>
-            <a:fillRef idx="1">
-              <a:schemeClr val="accent1"/>
-            </a:fillRef>
-            <a:effectRef idx="0">
-              <a:schemeClr val="accent1"/>
-            </a:effectRef>
-            <a:fontRef idx="minor">
-              <a:schemeClr val="lt1"/>
-            </a:fontRef>
-          </p:style>
-          <p:txBody>
-            <a:bodyPr rtlCol="0" anchor="ctr"/>
-            <a:lstStyle/>
-            <a:p>
-              <a:pPr algn="ctr"/>
-              <a:endParaRPr lang="en-US" sz="2942"/>
-            </a:p>
-          </p:txBody>
-        </p:sp>
-        <p:sp>
-          <p:nvSpPr>
-            <p:cNvPr id="17" name="Oval 16">
-              <a:extLst>
-                <a:ext uri="{FF2B5EF4-FFF2-40B4-BE49-F238E27FC236}">
-                  <a16:creationId xmlns:a16="http://schemas.microsoft.com/office/drawing/2014/main" id="{304FA3B0-09F4-45FD-800A-47CE0B222012}"/>
-                </a:ext>
-              </a:extLst>
-            </p:cNvPr>
-            <p:cNvSpPr/>
-            <p:nvPr/>
-          </p:nvSpPr>
-          <p:spPr>
-            <a:xfrm>
-              <a:off x="10248902" y="2934704"/>
-              <a:ext cx="104274" cy="112294"/>
-            </a:xfrm>
-            <a:prstGeom prst="ellipse">
-              <a:avLst/>
-            </a:prstGeom>
-            <a:solidFill>
-              <a:schemeClr val="tx1"/>
-            </a:solidFill>
-            <a:ln>
-              <a:solidFill>
-                <a:schemeClr val="tx1"/>
-              </a:solidFill>
-            </a:ln>
-          </p:spPr>
-          <p:style>
-            <a:lnRef idx="2">
-              <a:schemeClr val="accent1">
-                <a:shade val="50000"/>
-              </a:schemeClr>
-            </a:lnRef>
-            <a:fillRef idx="1">
-              <a:schemeClr val="accent1"/>
-            </a:fillRef>
-            <a:effectRef idx="0">
-              <a:schemeClr val="accent1"/>
-            </a:effectRef>
-            <a:fontRef idx="minor">
-              <a:schemeClr val="lt1"/>
-            </a:fontRef>
-          </p:style>
-          <p:txBody>
-            <a:bodyPr rtlCol="0" anchor="ctr"/>
-            <a:lstStyle/>
-            <a:p>
-              <a:pPr algn="ctr"/>
-              <a:endParaRPr lang="en-US" sz="2942"/>
-            </a:p>
-          </p:txBody>
-        </p:sp>
-        <p:sp>
-          <p:nvSpPr>
-            <p:cNvPr id="18" name="Oval 17">
-              <a:extLst>
-                <a:ext uri="{FF2B5EF4-FFF2-40B4-BE49-F238E27FC236}">
-                  <a16:creationId xmlns:a16="http://schemas.microsoft.com/office/drawing/2014/main" id="{9006FAB6-6A46-49FF-ABD8-492628C15C4C}"/>
-                </a:ext>
-              </a:extLst>
-            </p:cNvPr>
-            <p:cNvSpPr/>
-            <p:nvPr/>
-          </p:nvSpPr>
-          <p:spPr>
-            <a:xfrm>
-              <a:off x="10808371" y="2939716"/>
-              <a:ext cx="104274" cy="112294"/>
-            </a:xfrm>
-            <a:prstGeom prst="ellipse">
-              <a:avLst/>
-            </a:prstGeom>
-            <a:solidFill>
-              <a:schemeClr val="tx1"/>
-            </a:solidFill>
-            <a:ln>
-              <a:solidFill>
-                <a:schemeClr val="tx1"/>
-              </a:solidFill>
-            </a:ln>
-          </p:spPr>
-          <p:style>
-            <a:lnRef idx="2">
-              <a:schemeClr val="accent1">
-                <a:shade val="50000"/>
-              </a:schemeClr>
-            </a:lnRef>
-            <a:fillRef idx="1">
-              <a:schemeClr val="accent1"/>
-            </a:fillRef>
-            <a:effectRef idx="0">
-              <a:schemeClr val="accent1"/>
-            </a:effectRef>
-            <a:fontRef idx="minor">
-              <a:schemeClr val="lt1"/>
-            </a:fontRef>
-          </p:style>
-          <p:txBody>
-            <a:bodyPr rtlCol="0" anchor="ctr"/>
-            <a:lstStyle/>
-            <a:p>
-              <a:pPr algn="ctr"/>
-              <a:endParaRPr lang="en-US" sz="2942"/>
-            </a:p>
-          </p:txBody>
-        </p:sp>
-        <p:sp>
-          <p:nvSpPr>
-            <p:cNvPr id="19" name="TextBox 18">
-              <a:extLst>
-                <a:ext uri="{FF2B5EF4-FFF2-40B4-BE49-F238E27FC236}">
-                  <a16:creationId xmlns:a16="http://schemas.microsoft.com/office/drawing/2014/main" id="{B532F833-E8AC-49DC-920A-FF74F458A339}"/>
-                </a:ext>
-              </a:extLst>
-            </p:cNvPr>
-            <p:cNvSpPr txBox="1"/>
-            <p:nvPr/>
-          </p:nvSpPr>
-          <p:spPr>
-            <a:xfrm>
-              <a:off x="1274164" y="3006106"/>
-              <a:ext cx="1624760" cy="308163"/>
-            </a:xfrm>
-            <a:prstGeom prst="rect">
-              <a:avLst/>
-            </a:prstGeom>
-            <a:noFill/>
-          </p:spPr>
-          <p:txBody>
-            <a:bodyPr wrap="square" rtlCol="0">
-              <a:spAutoFit/>
-            </a:bodyPr>
-            <a:lstStyle/>
-            <a:p>
-              <a:r>
-                <a:rPr lang="en-US" sz="2386" dirty="0"/>
-                <a:t>1950s-1970s</a:t>
-              </a:r>
-            </a:p>
-          </p:txBody>
-        </p:sp>
-        <p:sp>
-          <p:nvSpPr>
-            <p:cNvPr id="21" name="TextBox 20">
-              <a:extLst>
-                <a:ext uri="{FF2B5EF4-FFF2-40B4-BE49-F238E27FC236}">
-                  <a16:creationId xmlns:a16="http://schemas.microsoft.com/office/drawing/2014/main" id="{3EF45AC3-5E30-4DED-820C-ACBF39BE8D60}"/>
-                </a:ext>
-              </a:extLst>
-            </p:cNvPr>
-            <p:cNvSpPr txBox="1"/>
-            <p:nvPr/>
-          </p:nvSpPr>
-          <p:spPr>
-            <a:xfrm rot="18960263">
-              <a:off x="2739857" y="3041969"/>
-              <a:ext cx="699835" cy="308163"/>
-            </a:xfrm>
-            <a:prstGeom prst="rect">
-              <a:avLst/>
-            </a:prstGeom>
-            <a:noFill/>
-          </p:spPr>
-          <p:txBody>
-            <a:bodyPr wrap="square" rtlCol="0">
-              <a:spAutoFit/>
-            </a:bodyPr>
-            <a:lstStyle/>
-            <a:p>
-              <a:r>
-                <a:rPr lang="en-US" sz="2386" dirty="0"/>
-                <a:t>1979</a:t>
-              </a:r>
-            </a:p>
-          </p:txBody>
-        </p:sp>
-        <p:sp>
-          <p:nvSpPr>
-            <p:cNvPr id="22" name="TextBox 21">
-              <a:extLst>
-                <a:ext uri="{FF2B5EF4-FFF2-40B4-BE49-F238E27FC236}">
-                  <a16:creationId xmlns:a16="http://schemas.microsoft.com/office/drawing/2014/main" id="{06F491C6-B1CA-411B-B897-48388AF483E9}"/>
-                </a:ext>
-              </a:extLst>
-            </p:cNvPr>
-            <p:cNvSpPr txBox="1"/>
-            <p:nvPr/>
-          </p:nvSpPr>
-          <p:spPr>
-            <a:xfrm rot="18960263">
-              <a:off x="3105815" y="3041969"/>
-              <a:ext cx="699835" cy="308163"/>
-            </a:xfrm>
-            <a:prstGeom prst="rect">
-              <a:avLst/>
-            </a:prstGeom>
-            <a:noFill/>
-          </p:spPr>
-          <p:txBody>
-            <a:bodyPr wrap="square" rtlCol="0">
-              <a:spAutoFit/>
-            </a:bodyPr>
-            <a:lstStyle/>
-            <a:p>
-              <a:r>
-                <a:rPr lang="en-US" sz="2386" dirty="0"/>
-                <a:t>1980</a:t>
-              </a:r>
-            </a:p>
-          </p:txBody>
-        </p:sp>
-        <p:sp>
-          <p:nvSpPr>
-            <p:cNvPr id="23" name="TextBox 22">
-              <a:extLst>
-                <a:ext uri="{FF2B5EF4-FFF2-40B4-BE49-F238E27FC236}">
-                  <a16:creationId xmlns:a16="http://schemas.microsoft.com/office/drawing/2014/main" id="{1DF75E0E-0DDA-4AB7-AA05-97BDF0565E6A}"/>
-                </a:ext>
-              </a:extLst>
-            </p:cNvPr>
-            <p:cNvSpPr txBox="1"/>
-            <p:nvPr/>
-          </p:nvSpPr>
-          <p:spPr>
-            <a:xfrm rot="18960263">
-              <a:off x="4395201" y="3031526"/>
-              <a:ext cx="699835" cy="308163"/>
-            </a:xfrm>
-            <a:prstGeom prst="rect">
-              <a:avLst/>
-            </a:prstGeom>
-            <a:noFill/>
-          </p:spPr>
-          <p:txBody>
-            <a:bodyPr wrap="square" rtlCol="0">
-              <a:spAutoFit/>
-            </a:bodyPr>
-            <a:lstStyle/>
-            <a:p>
-              <a:r>
-                <a:rPr lang="en-US" sz="2386" dirty="0"/>
-                <a:t>1988</a:t>
-              </a:r>
-            </a:p>
-          </p:txBody>
-        </p:sp>
-        <p:sp>
-          <p:nvSpPr>
-            <p:cNvPr id="24" name="TextBox 23">
-              <a:extLst>
-                <a:ext uri="{FF2B5EF4-FFF2-40B4-BE49-F238E27FC236}">
-                  <a16:creationId xmlns:a16="http://schemas.microsoft.com/office/drawing/2014/main" id="{3B60AF21-5B97-4DDD-AF09-BBD6F5E0940D}"/>
-                </a:ext>
-              </a:extLst>
-            </p:cNvPr>
-            <p:cNvSpPr txBox="1"/>
-            <p:nvPr/>
-          </p:nvSpPr>
-          <p:spPr>
-            <a:xfrm rot="18960263">
-              <a:off x="4954173" y="3041969"/>
-              <a:ext cx="699835" cy="308163"/>
-            </a:xfrm>
-            <a:prstGeom prst="rect">
-              <a:avLst/>
-            </a:prstGeom>
-            <a:noFill/>
-          </p:spPr>
-          <p:txBody>
-            <a:bodyPr wrap="square" rtlCol="0">
-              <a:spAutoFit/>
-            </a:bodyPr>
-            <a:lstStyle/>
-            <a:p>
-              <a:r>
-                <a:rPr lang="en-US" sz="2386" dirty="0"/>
-                <a:t>1991</a:t>
-              </a:r>
-            </a:p>
-          </p:txBody>
-        </p:sp>
-        <p:sp>
-          <p:nvSpPr>
-            <p:cNvPr id="25" name="TextBox 24">
-              <a:extLst>
-                <a:ext uri="{FF2B5EF4-FFF2-40B4-BE49-F238E27FC236}">
-                  <a16:creationId xmlns:a16="http://schemas.microsoft.com/office/drawing/2014/main" id="{3C3091AC-CF78-4E2E-BF0D-16F0724C789F}"/>
-                </a:ext>
-              </a:extLst>
-            </p:cNvPr>
-            <p:cNvSpPr txBox="1"/>
-            <p:nvPr/>
-          </p:nvSpPr>
-          <p:spPr>
-            <a:xfrm rot="18960263">
-              <a:off x="5865062" y="3031523"/>
-              <a:ext cx="699835" cy="308163"/>
-            </a:xfrm>
-            <a:prstGeom prst="rect">
-              <a:avLst/>
-            </a:prstGeom>
-            <a:noFill/>
-          </p:spPr>
-          <p:txBody>
-            <a:bodyPr wrap="square" rtlCol="0">
-              <a:spAutoFit/>
-            </a:bodyPr>
-            <a:lstStyle/>
-            <a:p>
-              <a:r>
-                <a:rPr lang="en-US" sz="2386" dirty="0"/>
-                <a:t>1996</a:t>
-              </a:r>
-            </a:p>
-          </p:txBody>
-        </p:sp>
-        <p:sp>
-          <p:nvSpPr>
-            <p:cNvPr id="26" name="TextBox 25">
-              <a:extLst>
-                <a:ext uri="{FF2B5EF4-FFF2-40B4-BE49-F238E27FC236}">
-                  <a16:creationId xmlns:a16="http://schemas.microsoft.com/office/drawing/2014/main" id="{77F7301E-6490-484D-B540-56F2219737E0}"/>
-                </a:ext>
-              </a:extLst>
-            </p:cNvPr>
-            <p:cNvSpPr txBox="1"/>
-            <p:nvPr/>
-          </p:nvSpPr>
-          <p:spPr>
-            <a:xfrm rot="18960263">
-              <a:off x="6575930" y="3045297"/>
-              <a:ext cx="699835" cy="308163"/>
-            </a:xfrm>
-            <a:prstGeom prst="rect">
-              <a:avLst/>
-            </a:prstGeom>
-            <a:noFill/>
-          </p:spPr>
-          <p:txBody>
-            <a:bodyPr wrap="square" rtlCol="0">
-              <a:spAutoFit/>
-            </a:bodyPr>
-            <a:lstStyle/>
-            <a:p>
-              <a:r>
-                <a:rPr lang="en-US" sz="2386" dirty="0"/>
-                <a:t>2000</a:t>
-              </a:r>
-            </a:p>
-          </p:txBody>
-        </p:sp>
-        <p:sp>
-          <p:nvSpPr>
-            <p:cNvPr id="27" name="TextBox 26">
-              <a:extLst>
-                <a:ext uri="{FF2B5EF4-FFF2-40B4-BE49-F238E27FC236}">
-                  <a16:creationId xmlns:a16="http://schemas.microsoft.com/office/drawing/2014/main" id="{9B690569-2846-46D1-AB5A-70BE3A51595C}"/>
-                </a:ext>
-              </a:extLst>
-            </p:cNvPr>
-            <p:cNvSpPr txBox="1"/>
-            <p:nvPr/>
-          </p:nvSpPr>
-          <p:spPr>
-            <a:xfrm rot="18960263">
-              <a:off x="7485317" y="3045297"/>
-              <a:ext cx="699835" cy="308163"/>
-            </a:xfrm>
-            <a:prstGeom prst="rect">
-              <a:avLst/>
-            </a:prstGeom>
-            <a:noFill/>
-          </p:spPr>
-          <p:txBody>
-            <a:bodyPr wrap="square" rtlCol="0">
-              <a:spAutoFit/>
-            </a:bodyPr>
-            <a:lstStyle/>
-            <a:p>
-              <a:r>
-                <a:rPr lang="en-US" sz="2386" dirty="0"/>
-                <a:t>2005</a:t>
-              </a:r>
-            </a:p>
-          </p:txBody>
-        </p:sp>
-        <p:sp>
-          <p:nvSpPr>
-            <p:cNvPr id="28" name="TextBox 27">
-              <a:extLst>
-                <a:ext uri="{FF2B5EF4-FFF2-40B4-BE49-F238E27FC236}">
-                  <a16:creationId xmlns:a16="http://schemas.microsoft.com/office/drawing/2014/main" id="{29C65B7D-C004-432A-9883-4B7B9D55065A}"/>
-                </a:ext>
-              </a:extLst>
-            </p:cNvPr>
-            <p:cNvSpPr txBox="1"/>
-            <p:nvPr/>
-          </p:nvSpPr>
-          <p:spPr>
-            <a:xfrm rot="18960263">
-              <a:off x="9465011" y="3031524"/>
-              <a:ext cx="699835" cy="308163"/>
-            </a:xfrm>
-            <a:prstGeom prst="rect">
-              <a:avLst/>
-            </a:prstGeom>
-            <a:noFill/>
-          </p:spPr>
-          <p:txBody>
-            <a:bodyPr wrap="square" rtlCol="0">
-              <a:spAutoFit/>
-            </a:bodyPr>
-            <a:lstStyle/>
-            <a:p>
-              <a:r>
-                <a:rPr lang="en-US" sz="2386" dirty="0"/>
-                <a:t>2016</a:t>
-              </a:r>
-            </a:p>
-          </p:txBody>
-        </p:sp>
-        <p:sp>
-          <p:nvSpPr>
-            <p:cNvPr id="29" name="TextBox 28">
-              <a:extLst>
-                <a:ext uri="{FF2B5EF4-FFF2-40B4-BE49-F238E27FC236}">
-                  <a16:creationId xmlns:a16="http://schemas.microsoft.com/office/drawing/2014/main" id="{0C15B57B-11D4-47E4-8D9F-D271EF742937}"/>
-                </a:ext>
-              </a:extLst>
-            </p:cNvPr>
-            <p:cNvSpPr txBox="1"/>
-            <p:nvPr/>
-          </p:nvSpPr>
-          <p:spPr>
-            <a:xfrm rot="18960263">
-              <a:off x="9845009" y="3041971"/>
-              <a:ext cx="699835" cy="308163"/>
-            </a:xfrm>
-            <a:prstGeom prst="rect">
-              <a:avLst/>
-            </a:prstGeom>
-            <a:noFill/>
-          </p:spPr>
-          <p:txBody>
-            <a:bodyPr wrap="square" rtlCol="0">
-              <a:spAutoFit/>
-            </a:bodyPr>
-            <a:lstStyle/>
-            <a:p>
-              <a:r>
-                <a:rPr lang="en-US" sz="2386" dirty="0"/>
-                <a:t>2018</a:t>
-              </a:r>
-            </a:p>
-          </p:txBody>
-        </p:sp>
-        <p:sp>
-          <p:nvSpPr>
-            <p:cNvPr id="30" name="TextBox 29">
-              <a:extLst>
-                <a:ext uri="{FF2B5EF4-FFF2-40B4-BE49-F238E27FC236}">
-                  <a16:creationId xmlns:a16="http://schemas.microsoft.com/office/drawing/2014/main" id="{64E4B1B7-24D1-42BD-953A-145EC3781505}"/>
-                </a:ext>
-              </a:extLst>
-            </p:cNvPr>
-            <p:cNvSpPr txBox="1"/>
-            <p:nvPr/>
-          </p:nvSpPr>
-          <p:spPr>
-            <a:xfrm rot="18960263">
-              <a:off x="10399462" y="3041971"/>
-              <a:ext cx="699835" cy="308163"/>
-            </a:xfrm>
-            <a:prstGeom prst="rect">
-              <a:avLst/>
-            </a:prstGeom>
-            <a:noFill/>
-          </p:spPr>
-          <p:txBody>
-            <a:bodyPr wrap="square" rtlCol="0">
-              <a:spAutoFit/>
-            </a:bodyPr>
-            <a:lstStyle/>
-            <a:p>
-              <a:r>
-                <a:rPr lang="en-US" sz="2386" dirty="0"/>
-                <a:t>2021</a:t>
-              </a:r>
-            </a:p>
-          </p:txBody>
-        </p:sp>
-        <p:sp>
-          <p:nvSpPr>
-            <p:cNvPr id="32" name="TextBox 31">
-              <a:extLst>
-                <a:ext uri="{FF2B5EF4-FFF2-40B4-BE49-F238E27FC236}">
-                  <a16:creationId xmlns:a16="http://schemas.microsoft.com/office/drawing/2014/main" id="{BF92D5CA-13AF-4124-98D4-A63CFB322EA9}"/>
-                </a:ext>
-              </a:extLst>
-            </p:cNvPr>
-            <p:cNvSpPr txBox="1"/>
-            <p:nvPr/>
-          </p:nvSpPr>
-          <p:spPr>
-            <a:xfrm>
-              <a:off x="530424" y="2412764"/>
-              <a:ext cx="1924233" cy="492733"/>
-            </a:xfrm>
-            <a:prstGeom prst="rect">
-              <a:avLst/>
-            </a:prstGeom>
-            <a:noFill/>
-          </p:spPr>
-          <p:txBody>
-            <a:bodyPr wrap="square" rtlCol="0">
-              <a:spAutoFit/>
-            </a:bodyPr>
-            <a:lstStyle/>
-            <a:p>
-              <a:pPr algn="ctr"/>
-              <a:r>
-                <a:rPr lang="en-US" sz="2087" dirty="0"/>
-                <a:t>Start of the </a:t>
-              </a:r>
-            </a:p>
-            <a:p>
-              <a:pPr algn="ctr"/>
-              <a:r>
-                <a:rPr lang="en-US" sz="2087" dirty="0"/>
-                <a:t>Great Acceleration</a:t>
-              </a:r>
-            </a:p>
-          </p:txBody>
-        </p:sp>
-        <p:sp>
-          <p:nvSpPr>
-            <p:cNvPr id="33" name="TextBox 32">
-              <a:extLst>
-                <a:ext uri="{FF2B5EF4-FFF2-40B4-BE49-F238E27FC236}">
-                  <a16:creationId xmlns:a16="http://schemas.microsoft.com/office/drawing/2014/main" id="{AE843DE8-31A2-4898-8D23-54CECBB7D140}"/>
-                </a:ext>
-              </a:extLst>
-            </p:cNvPr>
-            <p:cNvSpPr txBox="1"/>
-            <p:nvPr/>
-          </p:nvSpPr>
-          <p:spPr>
-            <a:xfrm>
-              <a:off x="2184749" y="1509036"/>
-              <a:ext cx="1522369" cy="492733"/>
-            </a:xfrm>
-            <a:prstGeom prst="rect">
-              <a:avLst/>
-            </a:prstGeom>
-            <a:noFill/>
-          </p:spPr>
-          <p:txBody>
-            <a:bodyPr wrap="square" rtlCol="0">
-              <a:spAutoFit/>
-            </a:bodyPr>
-            <a:lstStyle/>
-            <a:p>
-              <a:pPr algn="ctr"/>
-              <a:r>
-                <a:rPr lang="it-IT" sz="2087" dirty="0"/>
-                <a:t>UN/ECE LRTAP Sulphur Protocols</a:t>
-              </a:r>
-              <a:endParaRPr lang="en-US" sz="2087" dirty="0"/>
-            </a:p>
-          </p:txBody>
-        </p:sp>
-        <p:sp>
-          <p:nvSpPr>
-            <p:cNvPr id="34" name="TextBox 33">
-              <a:extLst>
-                <a:ext uri="{FF2B5EF4-FFF2-40B4-BE49-F238E27FC236}">
-                  <a16:creationId xmlns:a16="http://schemas.microsoft.com/office/drawing/2014/main" id="{18AA36F2-565F-4F96-A5A2-3792A38BC886}"/>
-                </a:ext>
-              </a:extLst>
-            </p:cNvPr>
-            <p:cNvSpPr txBox="1"/>
-            <p:nvPr/>
-          </p:nvSpPr>
-          <p:spPr>
-            <a:xfrm>
-              <a:off x="2968220" y="2485023"/>
-              <a:ext cx="1924233" cy="277329"/>
-            </a:xfrm>
-            <a:prstGeom prst="rect">
-              <a:avLst/>
-            </a:prstGeom>
-            <a:noFill/>
-          </p:spPr>
-          <p:txBody>
-            <a:bodyPr wrap="square" rtlCol="0">
-              <a:spAutoFit/>
-            </a:bodyPr>
-            <a:lstStyle/>
-            <a:p>
-              <a:pPr algn="ctr"/>
-              <a:r>
-                <a:rPr lang="en-US" sz="2087" dirty="0"/>
-                <a:t>Peak acidification</a:t>
-              </a:r>
-            </a:p>
-          </p:txBody>
-        </p:sp>
-        <p:sp>
-          <p:nvSpPr>
-            <p:cNvPr id="35" name="TextBox 34">
-              <a:extLst>
-                <a:ext uri="{FF2B5EF4-FFF2-40B4-BE49-F238E27FC236}">
-                  <a16:creationId xmlns:a16="http://schemas.microsoft.com/office/drawing/2014/main" id="{B8892350-487C-4901-9129-D197A7705679}"/>
-                </a:ext>
-              </a:extLst>
-            </p:cNvPr>
-            <p:cNvSpPr txBox="1"/>
-            <p:nvPr/>
-          </p:nvSpPr>
-          <p:spPr>
-            <a:xfrm>
-              <a:off x="3832199" y="2064334"/>
-              <a:ext cx="1852036" cy="492733"/>
-            </a:xfrm>
-            <a:prstGeom prst="rect">
-              <a:avLst/>
-            </a:prstGeom>
-            <a:noFill/>
-          </p:spPr>
-          <p:txBody>
-            <a:bodyPr wrap="square" rtlCol="0">
-              <a:spAutoFit/>
-            </a:bodyPr>
-            <a:lstStyle/>
-            <a:p>
-              <a:pPr algn="ctr"/>
-              <a:r>
-                <a:rPr lang="en-US" sz="2087" dirty="0"/>
-                <a:t>Peak EU use of </a:t>
-              </a:r>
-            </a:p>
-            <a:p>
-              <a:pPr algn="ctr"/>
-              <a:r>
-                <a:rPr lang="en-US" sz="2087" dirty="0"/>
-                <a:t>N and P fertilizers</a:t>
-              </a:r>
-            </a:p>
-          </p:txBody>
-        </p:sp>
-        <p:sp>
-          <p:nvSpPr>
-            <p:cNvPr id="37" name="TextBox 36">
-              <a:extLst>
-                <a:ext uri="{FF2B5EF4-FFF2-40B4-BE49-F238E27FC236}">
-                  <a16:creationId xmlns:a16="http://schemas.microsoft.com/office/drawing/2014/main" id="{EA810D53-F0DC-4857-81D3-975AB5EAA3DE}"/>
-                </a:ext>
-              </a:extLst>
-            </p:cNvPr>
-            <p:cNvSpPr txBox="1"/>
-            <p:nvPr/>
-          </p:nvSpPr>
-          <p:spPr>
-            <a:xfrm>
-              <a:off x="5400581" y="2243377"/>
-              <a:ext cx="1924233" cy="492733"/>
-            </a:xfrm>
-            <a:prstGeom prst="rect">
-              <a:avLst/>
-            </a:prstGeom>
-            <a:noFill/>
-          </p:spPr>
-          <p:txBody>
-            <a:bodyPr wrap="square" rtlCol="0">
-              <a:spAutoFit/>
-            </a:bodyPr>
-            <a:lstStyle/>
-            <a:p>
-              <a:pPr algn="ctr"/>
-              <a:r>
-                <a:rPr lang="en-US" sz="2087" dirty="0"/>
-                <a:t>Peak alien species introduction</a:t>
-              </a:r>
-            </a:p>
-          </p:txBody>
-        </p:sp>
-        <p:sp>
-          <p:nvSpPr>
-            <p:cNvPr id="38" name="TextBox 37">
-              <a:extLst>
-                <a:ext uri="{FF2B5EF4-FFF2-40B4-BE49-F238E27FC236}">
-                  <a16:creationId xmlns:a16="http://schemas.microsoft.com/office/drawing/2014/main" id="{F7A38FFC-E335-49C8-BBE4-46FFD866D0B2}"/>
-                </a:ext>
-              </a:extLst>
-            </p:cNvPr>
-            <p:cNvSpPr txBox="1"/>
-            <p:nvPr/>
-          </p:nvSpPr>
-          <p:spPr>
-            <a:xfrm>
-              <a:off x="6320323" y="1459419"/>
-              <a:ext cx="1484484" cy="708137"/>
-            </a:xfrm>
-            <a:prstGeom prst="rect">
-              <a:avLst/>
-            </a:prstGeom>
-            <a:noFill/>
-          </p:spPr>
-          <p:txBody>
-            <a:bodyPr wrap="square" rtlCol="0">
-              <a:spAutoFit/>
-            </a:bodyPr>
-            <a:lstStyle/>
-            <a:p>
-              <a:pPr algn="ctr"/>
-              <a:r>
-                <a:rPr lang="en-US" sz="2087" dirty="0"/>
-                <a:t>EU Water Framework Directive</a:t>
-              </a:r>
-            </a:p>
-          </p:txBody>
-        </p:sp>
-        <p:sp>
-          <p:nvSpPr>
-            <p:cNvPr id="39" name="TextBox 38">
-              <a:extLst>
-                <a:ext uri="{FF2B5EF4-FFF2-40B4-BE49-F238E27FC236}">
-                  <a16:creationId xmlns:a16="http://schemas.microsoft.com/office/drawing/2014/main" id="{B9ABB514-94CA-45C8-BBD6-ABB203FF5EF0}"/>
-                </a:ext>
-              </a:extLst>
-            </p:cNvPr>
-            <p:cNvSpPr txBox="1"/>
-            <p:nvPr/>
-          </p:nvSpPr>
-          <p:spPr>
-            <a:xfrm>
-              <a:off x="7093003" y="2214150"/>
-              <a:ext cx="1756344" cy="492733"/>
-            </a:xfrm>
-            <a:prstGeom prst="rect">
-              <a:avLst/>
-            </a:prstGeom>
-            <a:noFill/>
-          </p:spPr>
-          <p:txBody>
-            <a:bodyPr wrap="square" rtlCol="0">
-              <a:spAutoFit/>
-            </a:bodyPr>
-            <a:lstStyle/>
-            <a:p>
-              <a:pPr algn="ctr"/>
-              <a:r>
-                <a:rPr lang="en-US" sz="2087" dirty="0"/>
-                <a:t>New neonics authorized in Europe</a:t>
-              </a:r>
-            </a:p>
-          </p:txBody>
-        </p:sp>
-        <p:sp>
-          <p:nvSpPr>
-            <p:cNvPr id="40" name="TextBox 39">
-              <a:extLst>
-                <a:ext uri="{FF2B5EF4-FFF2-40B4-BE49-F238E27FC236}">
-                  <a16:creationId xmlns:a16="http://schemas.microsoft.com/office/drawing/2014/main" id="{B955C533-6643-44F9-B6FD-809DEBFE3D78}"/>
-                </a:ext>
-              </a:extLst>
-            </p:cNvPr>
-            <p:cNvSpPr txBox="1"/>
-            <p:nvPr/>
-          </p:nvSpPr>
-          <p:spPr>
-            <a:xfrm>
-              <a:off x="8993351" y="2209106"/>
-              <a:ext cx="1565729" cy="492733"/>
-            </a:xfrm>
-            <a:prstGeom prst="rect">
-              <a:avLst/>
-            </a:prstGeom>
-            <a:noFill/>
-          </p:spPr>
-          <p:txBody>
-            <a:bodyPr wrap="square" rtlCol="0">
-              <a:spAutoFit/>
-            </a:bodyPr>
-            <a:lstStyle/>
-            <a:p>
-              <a:pPr algn="ctr"/>
-              <a:r>
-                <a:rPr lang="en-US" sz="2087" dirty="0"/>
-                <a:t>Paris Climate Accord</a:t>
-              </a:r>
-            </a:p>
-          </p:txBody>
-        </p:sp>
-        <p:sp>
-          <p:nvSpPr>
-            <p:cNvPr id="41" name="TextBox 40">
-              <a:extLst>
-                <a:ext uri="{FF2B5EF4-FFF2-40B4-BE49-F238E27FC236}">
-                  <a16:creationId xmlns:a16="http://schemas.microsoft.com/office/drawing/2014/main" id="{BAAF337C-FEFD-4DFE-976A-8B879F0D791D}"/>
-                </a:ext>
-              </a:extLst>
-            </p:cNvPr>
-            <p:cNvSpPr txBox="1"/>
-            <p:nvPr/>
-          </p:nvSpPr>
-          <p:spPr>
-            <a:xfrm>
-              <a:off x="8875089" y="1520599"/>
-              <a:ext cx="1855125" cy="492733"/>
-            </a:xfrm>
-            <a:prstGeom prst="rect">
-              <a:avLst/>
-            </a:prstGeom>
-            <a:noFill/>
-          </p:spPr>
-          <p:txBody>
-            <a:bodyPr wrap="square" rtlCol="0">
-              <a:spAutoFit/>
-            </a:bodyPr>
-            <a:lstStyle/>
-            <a:p>
-              <a:pPr algn="ctr"/>
-              <a:r>
-                <a:rPr lang="en-US" sz="2087" dirty="0"/>
-                <a:t>EU Strategy for Plastics in a Circular Economy</a:t>
-              </a:r>
-            </a:p>
-          </p:txBody>
-        </p:sp>
-        <p:sp>
-          <p:nvSpPr>
-            <p:cNvPr id="42" name="TextBox 41">
-              <a:extLst>
-                <a:ext uri="{FF2B5EF4-FFF2-40B4-BE49-F238E27FC236}">
-                  <a16:creationId xmlns:a16="http://schemas.microsoft.com/office/drawing/2014/main" id="{2F9592A5-EADE-4E74-8D2E-CAE565D75920}"/>
-                </a:ext>
-              </a:extLst>
-            </p:cNvPr>
-            <p:cNvSpPr txBox="1"/>
-            <p:nvPr/>
-          </p:nvSpPr>
-          <p:spPr>
-            <a:xfrm>
-              <a:off x="10410200" y="2073066"/>
-              <a:ext cx="927478" cy="708137"/>
-            </a:xfrm>
-            <a:prstGeom prst="rect">
-              <a:avLst/>
-            </a:prstGeom>
-            <a:noFill/>
-          </p:spPr>
-          <p:txBody>
-            <a:bodyPr wrap="square" rtlCol="0">
-              <a:spAutoFit/>
-            </a:bodyPr>
-            <a:lstStyle/>
-            <a:p>
-              <a:pPr algn="ctr"/>
-              <a:r>
-                <a:rPr lang="en-US" sz="2087" dirty="0"/>
-                <a:t>Hottest European summer</a:t>
-              </a:r>
-            </a:p>
-          </p:txBody>
-        </p:sp>
-        <p:cxnSp>
-          <p:nvCxnSpPr>
-            <p:cNvPr id="43" name="Straight Connector 42">
-              <a:extLst>
-                <a:ext uri="{FF2B5EF4-FFF2-40B4-BE49-F238E27FC236}">
-                  <a16:creationId xmlns:a16="http://schemas.microsoft.com/office/drawing/2014/main" id="{2BDC7F6E-5728-4BE2-BDFD-83BC491A6F80}"/>
-                </a:ext>
-              </a:extLst>
-            </p:cNvPr>
-            <p:cNvCxnSpPr>
-              <a:cxnSpLocks/>
-            </p:cNvCxnSpPr>
-            <p:nvPr/>
-          </p:nvCxnSpPr>
-          <p:spPr>
-            <a:xfrm flipH="1" flipV="1">
-              <a:off x="3250533" y="2032256"/>
-              <a:ext cx="1504" cy="929700"/>
-            </a:xfrm>
-            <a:prstGeom prst="line">
-              <a:avLst/>
-            </a:prstGeom>
-            <a:ln w="25400">
-              <a:solidFill>
-                <a:schemeClr val="tx1"/>
-              </a:solidFill>
-            </a:ln>
-          </p:spPr>
-          <p:style>
-            <a:lnRef idx="1">
-              <a:schemeClr val="dk1"/>
-            </a:lnRef>
-            <a:fillRef idx="0">
-              <a:schemeClr val="dk1"/>
-            </a:fillRef>
-            <a:effectRef idx="0">
-              <a:schemeClr val="dk1"/>
-            </a:effectRef>
-            <a:fontRef idx="minor">
-              <a:schemeClr val="tx1"/>
-            </a:fontRef>
-          </p:style>
-        </p:cxnSp>
-        <p:cxnSp>
-          <p:nvCxnSpPr>
-            <p:cNvPr id="47" name="Straight Connector 46">
-              <a:extLst>
-                <a:ext uri="{FF2B5EF4-FFF2-40B4-BE49-F238E27FC236}">
-                  <a16:creationId xmlns:a16="http://schemas.microsoft.com/office/drawing/2014/main" id="{6AF4437F-2910-4465-BEA1-0D73347A7A56}"/>
-                </a:ext>
-              </a:extLst>
-            </p:cNvPr>
-            <p:cNvCxnSpPr>
-              <a:cxnSpLocks/>
-            </p:cNvCxnSpPr>
-            <p:nvPr/>
-          </p:nvCxnSpPr>
-          <p:spPr>
-            <a:xfrm flipV="1">
-              <a:off x="4910891" y="2513792"/>
-              <a:ext cx="0" cy="494865"/>
-            </a:xfrm>
-            <a:prstGeom prst="line">
-              <a:avLst/>
-            </a:prstGeom>
-            <a:ln w="25400">
-              <a:solidFill>
-                <a:schemeClr val="tx1"/>
-              </a:solidFill>
-            </a:ln>
-          </p:spPr>
-          <p:style>
-            <a:lnRef idx="1">
-              <a:schemeClr val="dk1"/>
-            </a:lnRef>
-            <a:fillRef idx="0">
-              <a:schemeClr val="dk1"/>
-            </a:fillRef>
-            <a:effectRef idx="0">
-              <a:schemeClr val="dk1"/>
-            </a:effectRef>
-            <a:fontRef idx="minor">
-              <a:schemeClr val="tx1"/>
-            </a:fontRef>
-          </p:style>
-        </p:cxnSp>
-        <p:cxnSp>
-          <p:nvCxnSpPr>
-            <p:cNvPr id="48" name="Straight Connector 47">
-              <a:extLst>
-                <a:ext uri="{FF2B5EF4-FFF2-40B4-BE49-F238E27FC236}">
-                  <a16:creationId xmlns:a16="http://schemas.microsoft.com/office/drawing/2014/main" id="{C564DEB9-5D94-4607-9D4E-9D5E9A9C124A}"/>
-                </a:ext>
-              </a:extLst>
-            </p:cNvPr>
-            <p:cNvCxnSpPr>
-              <a:cxnSpLocks/>
-            </p:cNvCxnSpPr>
-            <p:nvPr/>
-          </p:nvCxnSpPr>
-          <p:spPr>
-            <a:xfrm flipH="1" flipV="1">
-              <a:off x="5438603" y="1918014"/>
-              <a:ext cx="1" cy="1043941"/>
-            </a:xfrm>
-            <a:prstGeom prst="line">
-              <a:avLst/>
-            </a:prstGeom>
-            <a:ln w="25400">
-              <a:solidFill>
-                <a:schemeClr val="tx1"/>
-              </a:solidFill>
-            </a:ln>
-          </p:spPr>
-          <p:style>
-            <a:lnRef idx="1">
-              <a:schemeClr val="dk1"/>
-            </a:lnRef>
-            <a:fillRef idx="0">
-              <a:schemeClr val="dk1"/>
-            </a:fillRef>
-            <a:effectRef idx="0">
-              <a:schemeClr val="dk1"/>
-            </a:effectRef>
-            <a:fontRef idx="minor">
-              <a:schemeClr val="tx1"/>
-            </a:fontRef>
-          </p:style>
-        </p:cxnSp>
-        <p:cxnSp>
-          <p:nvCxnSpPr>
-            <p:cNvPr id="51" name="Straight Connector 50">
-              <a:extLst>
-                <a:ext uri="{FF2B5EF4-FFF2-40B4-BE49-F238E27FC236}">
-                  <a16:creationId xmlns:a16="http://schemas.microsoft.com/office/drawing/2014/main" id="{C993A555-B20B-4843-93B6-512DF04690DA}"/>
-                </a:ext>
-              </a:extLst>
-            </p:cNvPr>
-            <p:cNvCxnSpPr>
-              <a:cxnSpLocks/>
-            </p:cNvCxnSpPr>
-            <p:nvPr/>
-          </p:nvCxnSpPr>
-          <p:spPr>
-            <a:xfrm flipV="1">
-              <a:off x="3459084" y="2729742"/>
-              <a:ext cx="0" cy="214263"/>
-            </a:xfrm>
-            <a:prstGeom prst="line">
-              <a:avLst/>
-            </a:prstGeom>
-            <a:ln w="25400">
-              <a:solidFill>
-                <a:schemeClr val="tx1"/>
-              </a:solidFill>
-            </a:ln>
-          </p:spPr>
-          <p:style>
-            <a:lnRef idx="1">
-              <a:schemeClr val="dk1"/>
-            </a:lnRef>
-            <a:fillRef idx="0">
-              <a:schemeClr val="dk1"/>
-            </a:fillRef>
-            <a:effectRef idx="0">
-              <a:schemeClr val="dk1"/>
-            </a:effectRef>
-            <a:fontRef idx="minor">
-              <a:schemeClr val="tx1"/>
-            </a:fontRef>
-          </p:style>
-        </p:cxnSp>
-        <p:cxnSp>
-          <p:nvCxnSpPr>
-            <p:cNvPr id="53" name="Straight Connector 52">
-              <a:extLst>
-                <a:ext uri="{FF2B5EF4-FFF2-40B4-BE49-F238E27FC236}">
-                  <a16:creationId xmlns:a16="http://schemas.microsoft.com/office/drawing/2014/main" id="{5986060C-6337-43E1-9D98-E0CA67AB3020}"/>
-                </a:ext>
-              </a:extLst>
-            </p:cNvPr>
-            <p:cNvCxnSpPr>
-              <a:cxnSpLocks/>
-            </p:cNvCxnSpPr>
-            <p:nvPr/>
-          </p:nvCxnSpPr>
-          <p:spPr>
-            <a:xfrm flipV="1">
-              <a:off x="6351945" y="2683875"/>
-              <a:ext cx="0" cy="293726"/>
-            </a:xfrm>
-            <a:prstGeom prst="line">
-              <a:avLst/>
-            </a:prstGeom>
-            <a:ln w="25400">
-              <a:solidFill>
-                <a:schemeClr val="tx1"/>
-              </a:solidFill>
-            </a:ln>
-          </p:spPr>
-          <p:style>
-            <a:lnRef idx="1">
-              <a:schemeClr val="dk1"/>
-            </a:lnRef>
-            <a:fillRef idx="0">
-              <a:schemeClr val="dk1"/>
-            </a:fillRef>
-            <a:effectRef idx="0">
-              <a:schemeClr val="dk1"/>
-            </a:effectRef>
-            <a:fontRef idx="minor">
-              <a:schemeClr val="tx1"/>
-            </a:fontRef>
-          </p:style>
-        </p:cxnSp>
-        <p:cxnSp>
-          <p:nvCxnSpPr>
-            <p:cNvPr id="58" name="Straight Connector 57">
-              <a:extLst>
-                <a:ext uri="{FF2B5EF4-FFF2-40B4-BE49-F238E27FC236}">
-                  <a16:creationId xmlns:a16="http://schemas.microsoft.com/office/drawing/2014/main" id="{C5555ACD-CCE8-41BF-8E29-546885F1F335}"/>
-                </a:ext>
-              </a:extLst>
-            </p:cNvPr>
-            <p:cNvCxnSpPr>
-              <a:cxnSpLocks/>
-            </p:cNvCxnSpPr>
-            <p:nvPr/>
-          </p:nvCxnSpPr>
-          <p:spPr>
-            <a:xfrm flipV="1">
-              <a:off x="7051096" y="2141783"/>
-              <a:ext cx="10421" cy="787234"/>
-            </a:xfrm>
-            <a:prstGeom prst="line">
-              <a:avLst/>
-            </a:prstGeom>
-            <a:ln w="25400">
-              <a:solidFill>
-                <a:schemeClr val="tx1"/>
-              </a:solidFill>
-            </a:ln>
-          </p:spPr>
-          <p:style>
-            <a:lnRef idx="1">
-              <a:schemeClr val="dk1"/>
-            </a:lnRef>
-            <a:fillRef idx="0">
-              <a:schemeClr val="dk1"/>
-            </a:fillRef>
-            <a:effectRef idx="0">
-              <a:schemeClr val="dk1"/>
-            </a:effectRef>
-            <a:fontRef idx="minor">
-              <a:schemeClr val="tx1"/>
-            </a:fontRef>
-          </p:style>
-        </p:cxnSp>
-        <p:cxnSp>
-          <p:nvCxnSpPr>
-            <p:cNvPr id="60" name="Straight Connector 59">
-              <a:extLst>
-                <a:ext uri="{FF2B5EF4-FFF2-40B4-BE49-F238E27FC236}">
-                  <a16:creationId xmlns:a16="http://schemas.microsoft.com/office/drawing/2014/main" id="{52D67A49-1FC8-4C1A-8C1B-809C16388B5F}"/>
-                </a:ext>
-              </a:extLst>
-            </p:cNvPr>
-            <p:cNvCxnSpPr>
-              <a:cxnSpLocks/>
-            </p:cNvCxnSpPr>
-            <p:nvPr/>
-          </p:nvCxnSpPr>
-          <p:spPr>
-            <a:xfrm flipV="1">
-              <a:off x="7964908" y="2667406"/>
-              <a:ext cx="0" cy="293726"/>
-            </a:xfrm>
-            <a:prstGeom prst="line">
-              <a:avLst/>
-            </a:prstGeom>
-            <a:ln w="25400">
-              <a:solidFill>
-                <a:schemeClr val="tx1"/>
-              </a:solidFill>
-            </a:ln>
-          </p:spPr>
-          <p:style>
-            <a:lnRef idx="1">
-              <a:schemeClr val="dk1"/>
-            </a:lnRef>
-            <a:fillRef idx="0">
-              <a:schemeClr val="dk1"/>
-            </a:fillRef>
-            <a:effectRef idx="0">
-              <a:schemeClr val="dk1"/>
-            </a:effectRef>
-            <a:fontRef idx="minor">
-              <a:schemeClr val="tx1"/>
-            </a:fontRef>
-          </p:style>
-        </p:cxnSp>
-        <p:cxnSp>
-          <p:nvCxnSpPr>
-            <p:cNvPr id="61" name="Straight Connector 60">
-              <a:extLst>
-                <a:ext uri="{FF2B5EF4-FFF2-40B4-BE49-F238E27FC236}">
-                  <a16:creationId xmlns:a16="http://schemas.microsoft.com/office/drawing/2014/main" id="{4057D1EC-567C-4478-BF7B-A04271AB0323}"/>
-                </a:ext>
-              </a:extLst>
-            </p:cNvPr>
-            <p:cNvCxnSpPr>
-              <a:cxnSpLocks/>
-            </p:cNvCxnSpPr>
-            <p:nvPr/>
-          </p:nvCxnSpPr>
-          <p:spPr>
-            <a:xfrm flipV="1">
-              <a:off x="9948115" y="2668880"/>
-              <a:ext cx="0" cy="293726"/>
-            </a:xfrm>
-            <a:prstGeom prst="line">
-              <a:avLst/>
-            </a:prstGeom>
-            <a:ln w="25400">
-              <a:solidFill>
-                <a:schemeClr val="tx1"/>
-              </a:solidFill>
-            </a:ln>
-          </p:spPr>
-          <p:style>
-            <a:lnRef idx="1">
-              <a:schemeClr val="dk1"/>
-            </a:lnRef>
-            <a:fillRef idx="0">
-              <a:schemeClr val="dk1"/>
-            </a:fillRef>
-            <a:effectRef idx="0">
-              <a:schemeClr val="dk1"/>
-            </a:effectRef>
-            <a:fontRef idx="minor">
-              <a:schemeClr val="tx1"/>
-            </a:fontRef>
-          </p:style>
-        </p:cxnSp>
-        <p:cxnSp>
-          <p:nvCxnSpPr>
-            <p:cNvPr id="62" name="Straight Connector 61">
-              <a:extLst>
-                <a:ext uri="{FF2B5EF4-FFF2-40B4-BE49-F238E27FC236}">
-                  <a16:creationId xmlns:a16="http://schemas.microsoft.com/office/drawing/2014/main" id="{77FEC6CC-ED34-4B2A-BBD2-8889C12217B5}"/>
-                </a:ext>
-              </a:extLst>
-            </p:cNvPr>
-            <p:cNvCxnSpPr>
-              <a:cxnSpLocks/>
-            </p:cNvCxnSpPr>
-            <p:nvPr/>
-          </p:nvCxnSpPr>
-          <p:spPr>
-            <a:xfrm flipH="1" flipV="1">
-              <a:off x="10300789" y="1991822"/>
-              <a:ext cx="1" cy="1043941"/>
-            </a:xfrm>
-            <a:prstGeom prst="line">
-              <a:avLst/>
-            </a:prstGeom>
-            <a:ln w="25400">
-              <a:solidFill>
-                <a:schemeClr val="tx1"/>
-              </a:solidFill>
-            </a:ln>
-          </p:spPr>
-          <p:style>
-            <a:lnRef idx="1">
-              <a:schemeClr val="dk1"/>
-            </a:lnRef>
-            <a:fillRef idx="0">
-              <a:schemeClr val="dk1"/>
-            </a:fillRef>
-            <a:effectRef idx="0">
-              <a:schemeClr val="dk1"/>
-            </a:effectRef>
-            <a:fontRef idx="minor">
-              <a:schemeClr val="tx1"/>
-            </a:fontRef>
-          </p:style>
-        </p:cxnSp>
-        <p:cxnSp>
-          <p:nvCxnSpPr>
-            <p:cNvPr id="63" name="Straight Connector 62">
-              <a:extLst>
-                <a:ext uri="{FF2B5EF4-FFF2-40B4-BE49-F238E27FC236}">
-                  <a16:creationId xmlns:a16="http://schemas.microsoft.com/office/drawing/2014/main" id="{7F3EA0FB-AEBE-4D76-9096-8221456E2C5B}"/>
-                </a:ext>
-              </a:extLst>
-            </p:cNvPr>
-            <p:cNvCxnSpPr>
-              <a:cxnSpLocks/>
-            </p:cNvCxnSpPr>
-            <p:nvPr/>
-          </p:nvCxnSpPr>
-          <p:spPr>
-            <a:xfrm flipV="1">
-              <a:off x="10860508" y="2739237"/>
-              <a:ext cx="0" cy="214263"/>
-            </a:xfrm>
-            <a:prstGeom prst="line">
-              <a:avLst/>
-            </a:prstGeom>
-            <a:ln w="25400">
-              <a:solidFill>
-                <a:schemeClr val="tx1"/>
-              </a:solidFill>
-            </a:ln>
-          </p:spPr>
-          <p:style>
-            <a:lnRef idx="1">
-              <a:schemeClr val="dk1"/>
-            </a:lnRef>
-            <a:fillRef idx="0">
-              <a:schemeClr val="dk1"/>
-            </a:fillRef>
-            <a:effectRef idx="0">
-              <a:schemeClr val="dk1"/>
-            </a:effectRef>
-            <a:fontRef idx="minor">
-              <a:schemeClr val="tx1"/>
-            </a:fontRef>
-          </p:style>
-        </p:cxnSp>
-        <p:sp>
-          <p:nvSpPr>
-            <p:cNvPr id="64" name="Star: 10 Points 63">
-              <a:extLst>
-                <a:ext uri="{FF2B5EF4-FFF2-40B4-BE49-F238E27FC236}">
-                  <a16:creationId xmlns:a16="http://schemas.microsoft.com/office/drawing/2014/main" id="{F2E37D50-4EB2-4D82-B9A0-BD0CCDFBB791}"/>
-                </a:ext>
-              </a:extLst>
-            </p:cNvPr>
-            <p:cNvSpPr/>
-            <p:nvPr/>
-          </p:nvSpPr>
-          <p:spPr>
-            <a:xfrm>
-              <a:off x="10774250" y="1907970"/>
-              <a:ext cx="232611" cy="221698"/>
-            </a:xfrm>
-            <a:prstGeom prst="star10">
-              <a:avLst/>
-            </a:prstGeom>
-            <a:solidFill>
-              <a:schemeClr val="accent2"/>
-            </a:solidFill>
-            <a:ln>
-              <a:solidFill>
-                <a:srgbClr val="C00000"/>
-              </a:solidFill>
-            </a:ln>
-          </p:spPr>
-          <p:style>
-            <a:lnRef idx="2">
-              <a:schemeClr val="accent1">
-                <a:shade val="50000"/>
-              </a:schemeClr>
-            </a:lnRef>
-            <a:fillRef idx="1">
-              <a:schemeClr val="accent1"/>
-            </a:fillRef>
-            <a:effectRef idx="0">
-              <a:schemeClr val="accent1"/>
-            </a:effectRef>
-            <a:fontRef idx="minor">
-              <a:schemeClr val="lt1"/>
-            </a:fontRef>
-          </p:style>
-          <p:txBody>
-            <a:bodyPr rtlCol="0" anchor="ctr"/>
-            <a:lstStyle/>
-            <a:p>
-              <a:pPr algn="ctr"/>
-              <a:endParaRPr lang="en-US" sz="2942">
-                <a:solidFill>
-                  <a:srgbClr val="FF0000"/>
-                </a:solidFill>
-              </a:endParaRPr>
-            </a:p>
-          </p:txBody>
-        </p:sp>
-        <p:pic>
-          <p:nvPicPr>
-            <p:cNvPr id="65" name="Picture 64">
-              <a:extLst>
-                <a:ext uri="{FF2B5EF4-FFF2-40B4-BE49-F238E27FC236}">
-                  <a16:creationId xmlns:a16="http://schemas.microsoft.com/office/drawing/2014/main" id="{BADBAF13-094D-4BD2-8B7C-065EB5F69441}"/>
-                </a:ext>
-              </a:extLst>
-            </p:cNvPr>
-            <p:cNvPicPr>
-              <a:picLocks noChangeAspect="1"/>
-            </p:cNvPicPr>
-            <p:nvPr/>
-          </p:nvPicPr>
-          <p:blipFill>
-            <a:blip r:embed="rId5"/>
-            <a:stretch>
-              <a:fillRect/>
-            </a:stretch>
-          </p:blipFill>
-          <p:spPr>
-            <a:xfrm>
-              <a:off x="8569205" y="1586988"/>
-              <a:ext cx="371151" cy="510333"/>
-            </a:xfrm>
-            <a:prstGeom prst="rect">
-              <a:avLst/>
-            </a:prstGeom>
-          </p:spPr>
-        </p:pic>
-        <p:pic>
-          <p:nvPicPr>
-            <p:cNvPr id="3" name="Picture 2">
-              <a:extLst>
-                <a:ext uri="{FF2B5EF4-FFF2-40B4-BE49-F238E27FC236}">
-                  <a16:creationId xmlns:a16="http://schemas.microsoft.com/office/drawing/2014/main" id="{BE07BC4C-F023-4142-89E1-4F0B356BBE2E}"/>
-                </a:ext>
-              </a:extLst>
-            </p:cNvPr>
-            <p:cNvPicPr>
-              <a:picLocks noChangeAspect="1"/>
-            </p:cNvPicPr>
-            <p:nvPr/>
-          </p:nvPicPr>
-          <p:blipFill>
-            <a:blip r:embed="rId6"/>
-            <a:stretch>
-              <a:fillRect/>
-            </a:stretch>
-          </p:blipFill>
-          <p:spPr>
-            <a:xfrm>
-              <a:off x="7734477" y="1690128"/>
-              <a:ext cx="501416" cy="632220"/>
-            </a:xfrm>
-            <a:prstGeom prst="rect">
-              <a:avLst/>
-            </a:prstGeom>
-          </p:spPr>
-        </p:pic>
-        <p:pic>
-          <p:nvPicPr>
-            <p:cNvPr id="4" name="Picture 3">
-              <a:extLst>
-                <a:ext uri="{FF2B5EF4-FFF2-40B4-BE49-F238E27FC236}">
-                  <a16:creationId xmlns:a16="http://schemas.microsoft.com/office/drawing/2014/main" id="{01E2D1AF-757C-44A3-AED5-6B82E3E0AF78}"/>
-                </a:ext>
-              </a:extLst>
-            </p:cNvPr>
-            <p:cNvPicPr>
-              <a:picLocks noChangeAspect="1"/>
-            </p:cNvPicPr>
-            <p:nvPr/>
-          </p:nvPicPr>
-          <p:blipFill>
-            <a:blip r:embed="rId7"/>
-            <a:stretch>
-              <a:fillRect/>
-            </a:stretch>
-          </p:blipFill>
-          <p:spPr>
-            <a:xfrm>
-              <a:off x="6161945" y="1864817"/>
-              <a:ext cx="381073" cy="460228"/>
-            </a:xfrm>
-            <a:prstGeom prst="rect">
-              <a:avLst/>
-            </a:prstGeom>
-          </p:spPr>
-        </p:pic>
-        <p:pic>
-          <p:nvPicPr>
-            <p:cNvPr id="2" name="Picture 1">
-              <a:extLst>
-                <a:ext uri="{FF2B5EF4-FFF2-40B4-BE49-F238E27FC236}">
-                  <a16:creationId xmlns:a16="http://schemas.microsoft.com/office/drawing/2014/main" id="{CCE1FE5D-94E3-4259-8D38-278AFEAFCBB8}"/>
-                </a:ext>
-              </a:extLst>
-            </p:cNvPr>
-            <p:cNvPicPr>
-              <a:picLocks noChangeAspect="1"/>
-            </p:cNvPicPr>
-            <p:nvPr/>
-          </p:nvPicPr>
-          <p:blipFill>
-            <a:blip r:embed="rId8"/>
-            <a:stretch>
-              <a:fillRect/>
-            </a:stretch>
-          </p:blipFill>
-          <p:spPr>
-            <a:xfrm>
-              <a:off x="4156006" y="1557172"/>
-              <a:ext cx="571478" cy="581025"/>
-            </a:xfrm>
-            <a:prstGeom prst="rect">
-              <a:avLst/>
-            </a:prstGeom>
-          </p:spPr>
-        </p:pic>
-        <p:sp>
-          <p:nvSpPr>
-            <p:cNvPr id="36" name="TextBox 35">
-              <a:extLst>
-                <a:ext uri="{FF2B5EF4-FFF2-40B4-BE49-F238E27FC236}">
-                  <a16:creationId xmlns:a16="http://schemas.microsoft.com/office/drawing/2014/main" id="{091C778E-4931-4C16-96B1-2FD7443C036F}"/>
-                </a:ext>
-              </a:extLst>
-            </p:cNvPr>
-            <p:cNvSpPr txBox="1"/>
-            <p:nvPr/>
-          </p:nvSpPr>
-          <p:spPr>
-            <a:xfrm>
-              <a:off x="4430514" y="1468602"/>
-              <a:ext cx="2143985" cy="492733"/>
-            </a:xfrm>
-            <a:prstGeom prst="rect">
-              <a:avLst/>
-            </a:prstGeom>
-            <a:noFill/>
-          </p:spPr>
-          <p:txBody>
-            <a:bodyPr wrap="square" rtlCol="0">
-              <a:spAutoFit/>
-            </a:bodyPr>
-            <a:lstStyle/>
-            <a:p>
-              <a:pPr algn="ctr"/>
-              <a:r>
-                <a:rPr lang="en-US" sz="2087" dirty="0"/>
-                <a:t>Urban Waste Water Treatment Directive</a:t>
-              </a:r>
-            </a:p>
-          </p:txBody>
-        </p:sp>
-        <p:pic>
-          <p:nvPicPr>
-            <p:cNvPr id="20" name="Picture 19">
-              <a:extLst>
-                <a:ext uri="{FF2B5EF4-FFF2-40B4-BE49-F238E27FC236}">
-                  <a16:creationId xmlns:a16="http://schemas.microsoft.com/office/drawing/2014/main" id="{48411100-2C9E-4AFE-8CA0-7FA7E8C19004}"/>
-                </a:ext>
-              </a:extLst>
-            </p:cNvPr>
-            <p:cNvPicPr>
-              <a:picLocks noChangeAspect="1"/>
-            </p:cNvPicPr>
-            <p:nvPr/>
-          </p:nvPicPr>
-          <p:blipFill>
-            <a:blip r:embed="rId9"/>
-            <a:stretch>
-              <a:fillRect/>
-            </a:stretch>
-          </p:blipFill>
-          <p:spPr>
-            <a:xfrm>
-              <a:off x="3283709" y="1990224"/>
-              <a:ext cx="847128" cy="482772"/>
-            </a:xfrm>
-            <a:prstGeom prst="rect">
-              <a:avLst/>
-            </a:prstGeom>
-          </p:spPr>
-        </p:pic>
-        <p:pic>
-          <p:nvPicPr>
-            <p:cNvPr id="31" name="Picture 30">
-              <a:extLst>
-                <a:ext uri="{FF2B5EF4-FFF2-40B4-BE49-F238E27FC236}">
-                  <a16:creationId xmlns:a16="http://schemas.microsoft.com/office/drawing/2014/main" id="{4A9EAB7E-2F8F-40C8-B631-05A37B4FD5C0}"/>
-                </a:ext>
-              </a:extLst>
-            </p:cNvPr>
-            <p:cNvPicPr>
-              <a:picLocks noChangeAspect="1"/>
-            </p:cNvPicPr>
-            <p:nvPr/>
-          </p:nvPicPr>
-          <p:blipFill>
-            <a:blip r:embed="rId10"/>
-            <a:stretch>
-              <a:fillRect/>
-            </a:stretch>
-          </p:blipFill>
-          <p:spPr>
-            <a:xfrm>
-              <a:off x="2218443" y="2191967"/>
-              <a:ext cx="820333" cy="682786"/>
-            </a:xfrm>
-            <a:prstGeom prst="rect">
-              <a:avLst/>
-            </a:prstGeom>
-          </p:spPr>
-        </p:pic>
-      </p:grpSp>
-    </p:spTree>
-    <p:extLst>
-      <p:ext uri="{BB962C8B-B14F-4D97-AF65-F5344CB8AC3E}">
-        <p14:creationId xmlns:p14="http://schemas.microsoft.com/office/powerpoint/2010/main" val="3568717846"/>
-      </p:ext>
-    </p:extLst>
-  </p:cSld>
-  <p:clrMapOvr>
-    <a:masterClrMapping/>
-  </p:clrMapOvr>
-</p:sld>
-</file>
-
-<file path=ppt/slides/slide2.xml><?xml version="1.0" encoding="utf-8"?>
-<p:sld xmlns:a="http://schemas.openxmlformats.org/drawingml/2006/main" xmlns:r="http://schemas.openxmlformats.org/officeDocument/2006/relationships" xmlns:p="http://schemas.openxmlformats.org/presentationml/2006/main">
-  <p:cSld>
-    <p:spTree>
-      <p:nvGrpSpPr>
-        <p:cNvPr id="1" name=""/>
-        <p:cNvGrpSpPr/>
-        <p:nvPr/>
-      </p:nvGrpSpPr>
-      <p:grpSpPr>
-        <a:xfrm>
-          <a:off x="0" y="0"/>
-          <a:ext cx="0" cy="0"/>
-          <a:chOff x="0" y="0"/>
-          <a:chExt cx="0" cy="0"/>
-        </a:xfrm>
-      </p:grpSpPr>
-      <p:sp>
-        <p:nvSpPr>
-          <p:cNvPr id="84" name="Rectangle 83">
-            <a:extLst>
-              <a:ext uri="{FF2B5EF4-FFF2-40B4-BE49-F238E27FC236}">
-                <a16:creationId xmlns:a16="http://schemas.microsoft.com/office/drawing/2014/main" id="{8CA2587C-A571-4D5A-9E2B-217379A39F05}"/>
-              </a:ext>
-            </a:extLst>
-          </p:cNvPr>
-          <p:cNvSpPr/>
-          <p:nvPr/>
-        </p:nvSpPr>
-        <p:spPr>
-          <a:xfrm>
-            <a:off x="2880147" y="1641516"/>
-            <a:ext cx="16419288" cy="3735656"/>
-          </a:xfrm>
-          <a:prstGeom prst="rect">
-            <a:avLst/>
-          </a:prstGeom>
-          <a:solidFill>
-            <a:schemeClr val="bg1"/>
-          </a:solidFill>
-          <a:ln>
-            <a:noFill/>
-          </a:ln>
-        </p:spPr>
-        <p:style>
-          <a:lnRef idx="2">
-            <a:schemeClr val="accent1">
-              <a:shade val="50000"/>
-            </a:schemeClr>
-          </a:lnRef>
-          <a:fillRef idx="1">
-            <a:schemeClr val="accent1"/>
-          </a:fillRef>
-          <a:effectRef idx="0">
-            <a:schemeClr val="accent1"/>
-          </a:effectRef>
-          <a:fontRef idx="minor">
-            <a:schemeClr val="lt1"/>
-          </a:fontRef>
-        </p:style>
-        <p:txBody>
-          <a:bodyPr rot="0" spcFirstLastPara="0" vertOverflow="overflow" horzOverflow="overflow" vert="horz" wrap="square" lIns="128258" tIns="64129" rIns="128258" bIns="64129" numCol="1" spcCol="0" rtlCol="0" fromWordArt="0" anchor="ctr" anchorCtr="0" forceAA="0" compatLnSpc="1">
-            <a:prstTxWarp prst="textNoShape">
-              <a:avLst/>
-            </a:prstTxWarp>
-            <a:noAutofit/>
-          </a:bodyPr>
-          <a:lstStyle/>
-          <a:p>
-            <a:pPr algn="ctr"/>
-            <a:endParaRPr lang="en-US" sz="2525"/>
-          </a:p>
-        </p:txBody>
-      </p:sp>
-      <p:grpSp>
-        <p:nvGrpSpPr>
-          <p:cNvPr id="55" name="Group 54">
-            <a:extLst>
-              <a:ext uri="{FF2B5EF4-FFF2-40B4-BE49-F238E27FC236}">
-                <a16:creationId xmlns:a16="http://schemas.microsoft.com/office/drawing/2014/main" id="{3FD1B67E-57E3-420C-8750-707C89DA8BC8}"/>
-              </a:ext>
-            </a:extLst>
-          </p:cNvPr>
-          <p:cNvGrpSpPr/>
-          <p:nvPr/>
-        </p:nvGrpSpPr>
-        <p:grpSpPr>
-          <a:xfrm>
-            <a:off x="2725488" y="1826738"/>
-            <a:ext cx="16485432" cy="3550433"/>
-            <a:chOff x="-171226" y="1994721"/>
-            <a:chExt cx="11753056" cy="2531231"/>
-          </a:xfrm>
-        </p:grpSpPr>
-        <p:grpSp>
-          <p:nvGrpSpPr>
-            <p:cNvPr id="44" name="Group 43">
-              <a:extLst>
-                <a:ext uri="{FF2B5EF4-FFF2-40B4-BE49-F238E27FC236}">
-                  <a16:creationId xmlns:a16="http://schemas.microsoft.com/office/drawing/2014/main" id="{2E19D01A-13BA-4D39-B19F-14DF8258F7C9}"/>
-                </a:ext>
-              </a:extLst>
-            </p:cNvPr>
-            <p:cNvGrpSpPr/>
-            <p:nvPr/>
-          </p:nvGrpSpPr>
-          <p:grpSpPr>
-            <a:xfrm>
-              <a:off x="-171226" y="1994721"/>
-              <a:ext cx="11753056" cy="2531231"/>
-              <a:chOff x="291276" y="1820844"/>
-              <a:chExt cx="11056280" cy="2381168"/>
-            </a:xfrm>
-          </p:grpSpPr>
-          <p:pic>
-            <p:nvPicPr>
-              <p:cNvPr id="3" name="Picture 2">
-                <a:extLst>
-                  <a:ext uri="{FF2B5EF4-FFF2-40B4-BE49-F238E27FC236}">
-                    <a16:creationId xmlns:a16="http://schemas.microsoft.com/office/drawing/2014/main" id="{BE07BC4C-F023-4142-89E1-4F0B356BBE2E}"/>
-                  </a:ext>
-                </a:extLst>
-              </p:cNvPr>
-              <p:cNvPicPr>
-                <a:picLocks noChangeAspect="1"/>
-              </p:cNvPicPr>
-              <p:nvPr/>
-            </p:nvPicPr>
-            <p:blipFill>
-              <a:blip r:embed="rId2"/>
-              <a:stretch>
-                <a:fillRect/>
-              </a:stretch>
-            </p:blipFill>
-            <p:spPr>
-              <a:xfrm>
-                <a:off x="8361606" y="2081836"/>
-                <a:ext cx="501416" cy="632220"/>
-              </a:xfrm>
-              <a:prstGeom prst="rect">
-                <a:avLst/>
-              </a:prstGeom>
-            </p:spPr>
-          </p:pic>
-          <p:pic>
-            <p:nvPicPr>
-              <p:cNvPr id="4" name="Picture 3">
-                <a:extLst>
-                  <a:ext uri="{FF2B5EF4-FFF2-40B4-BE49-F238E27FC236}">
-                    <a16:creationId xmlns:a16="http://schemas.microsoft.com/office/drawing/2014/main" id="{01E2D1AF-757C-44A3-AED5-6B82E3E0AF78}"/>
-                  </a:ext>
-                </a:extLst>
-              </p:cNvPr>
-              <p:cNvPicPr>
-                <a:picLocks noChangeAspect="1"/>
-              </p:cNvPicPr>
-              <p:nvPr/>
-            </p:nvPicPr>
-            <p:blipFill>
-              <a:blip r:embed="rId3"/>
-              <a:stretch>
-                <a:fillRect/>
-              </a:stretch>
-            </p:blipFill>
-            <p:spPr>
-              <a:xfrm>
-                <a:off x="5709036" y="1954907"/>
-                <a:ext cx="381073" cy="460228"/>
-              </a:xfrm>
-              <a:prstGeom prst="rect">
-                <a:avLst/>
-              </a:prstGeom>
-            </p:spPr>
-          </p:pic>
-          <p:pic>
-            <p:nvPicPr>
-              <p:cNvPr id="20" name="Picture 19">
-                <a:extLst>
-                  <a:ext uri="{FF2B5EF4-FFF2-40B4-BE49-F238E27FC236}">
-                    <a16:creationId xmlns:a16="http://schemas.microsoft.com/office/drawing/2014/main" id="{48411100-2C9E-4AFE-8CA0-7FA7E8C19004}"/>
-                  </a:ext>
-                </a:extLst>
-              </p:cNvPr>
-              <p:cNvPicPr>
-                <a:picLocks noChangeAspect="1"/>
-              </p:cNvPicPr>
-              <p:nvPr/>
-            </p:nvPicPr>
-            <p:blipFill>
-              <a:blip r:embed="rId4"/>
-              <a:stretch>
-                <a:fillRect/>
-              </a:stretch>
-            </p:blipFill>
-            <p:spPr>
-              <a:xfrm>
-                <a:off x="3420952" y="3269472"/>
-                <a:ext cx="847128" cy="482772"/>
-              </a:xfrm>
-              <a:prstGeom prst="rect">
-                <a:avLst/>
-              </a:prstGeom>
-            </p:spPr>
-          </p:pic>
-          <p:pic>
-            <p:nvPicPr>
-              <p:cNvPr id="2" name="Picture 1">
-                <a:extLst>
-                  <a:ext uri="{FF2B5EF4-FFF2-40B4-BE49-F238E27FC236}">
-                    <a16:creationId xmlns:a16="http://schemas.microsoft.com/office/drawing/2014/main" id="{CCE1FE5D-94E3-4259-8D38-278AFEAFCBB8}"/>
-                  </a:ext>
-                </a:extLst>
-              </p:cNvPr>
-              <p:cNvPicPr>
-                <a:picLocks noChangeAspect="1"/>
-              </p:cNvPicPr>
-              <p:nvPr/>
-            </p:nvPicPr>
-            <p:blipFill>
-              <a:blip r:embed="rId5"/>
-              <a:stretch>
-                <a:fillRect/>
-              </a:stretch>
-            </p:blipFill>
-            <p:spPr>
-              <a:xfrm>
-                <a:off x="3805129" y="1898588"/>
-                <a:ext cx="571478" cy="581025"/>
-              </a:xfrm>
-              <a:prstGeom prst="rect">
-                <a:avLst/>
-              </a:prstGeom>
-            </p:spPr>
-          </p:pic>
-          <p:pic>
-            <p:nvPicPr>
-              <p:cNvPr id="67" name="Picture 66">
-                <a:extLst>
-                  <a:ext uri="{FF2B5EF4-FFF2-40B4-BE49-F238E27FC236}">
-                    <a16:creationId xmlns:a16="http://schemas.microsoft.com/office/drawing/2014/main" id="{A7DB5665-7042-4676-AF10-82712EE9D19A}"/>
-                  </a:ext>
-                </a:extLst>
-              </p:cNvPr>
-              <p:cNvPicPr>
-                <a:picLocks noChangeAspect="1"/>
-              </p:cNvPicPr>
-              <p:nvPr/>
-            </p:nvPicPr>
-            <p:blipFill>
-              <a:blip r:embed="rId6"/>
-              <a:stretch>
-                <a:fillRect/>
-              </a:stretch>
-            </p:blipFill>
-            <p:spPr>
-              <a:xfrm>
-                <a:off x="8723026" y="3265759"/>
-                <a:ext cx="658185" cy="651947"/>
-              </a:xfrm>
-              <a:prstGeom prst="rect">
-                <a:avLst/>
-              </a:prstGeom>
-            </p:spPr>
-          </p:pic>
-          <p:cxnSp>
-            <p:nvCxnSpPr>
-              <p:cNvPr id="7" name="Straight Connector 6">
-                <a:extLst>
-                  <a:ext uri="{FF2B5EF4-FFF2-40B4-BE49-F238E27FC236}">
-                    <a16:creationId xmlns:a16="http://schemas.microsoft.com/office/drawing/2014/main" id="{DFCBDCC5-DD3D-46BE-AE46-E41F688050C8}"/>
-                  </a:ext>
-                </a:extLst>
-              </p:cNvPr>
-              <p:cNvCxnSpPr/>
-              <p:nvPr/>
-            </p:nvCxnSpPr>
-            <p:spPr>
-              <a:xfrm>
-                <a:off x="604587" y="2991853"/>
-                <a:ext cx="10384256" cy="0"/>
-              </a:xfrm>
-              <a:prstGeom prst="line">
-                <a:avLst/>
-              </a:prstGeom>
-              <a:ln w="28575">
-                <a:solidFill>
-                  <a:schemeClr val="tx1"/>
-                </a:solidFill>
-              </a:ln>
-            </p:spPr>
-            <p:style>
-              <a:lnRef idx="1">
-                <a:schemeClr val="dk1"/>
-              </a:lnRef>
-              <a:fillRef idx="0">
-                <a:schemeClr val="dk1"/>
-              </a:fillRef>
-              <a:effectRef idx="0">
-                <a:schemeClr val="dk1"/>
-              </a:effectRef>
-              <a:fontRef idx="minor">
-                <a:schemeClr val="tx1"/>
-              </a:fontRef>
-            </p:style>
-          </p:cxnSp>
-          <p:sp>
-            <p:nvSpPr>
-              <p:cNvPr id="8" name="Oval 7">
-                <a:extLst>
-                  <a:ext uri="{FF2B5EF4-FFF2-40B4-BE49-F238E27FC236}">
-                    <a16:creationId xmlns:a16="http://schemas.microsoft.com/office/drawing/2014/main" id="{6A0328C6-4BA3-446C-9E12-F8FC64A6301F}"/>
-                  </a:ext>
-                </a:extLst>
-              </p:cNvPr>
-              <p:cNvSpPr/>
-              <p:nvPr/>
-            </p:nvSpPr>
-            <p:spPr>
-              <a:xfrm>
-                <a:off x="520876" y="2934704"/>
-                <a:ext cx="2677520" cy="112294"/>
-              </a:xfrm>
-              <a:prstGeom prst="ellipse">
-                <a:avLst/>
-              </a:prstGeom>
-              <a:solidFill>
-                <a:schemeClr val="tx1"/>
-              </a:solidFill>
-              <a:ln>
-                <a:solidFill>
-                  <a:schemeClr val="tx1"/>
-                </a:solidFill>
-              </a:ln>
-            </p:spPr>
-            <p:style>
-              <a:lnRef idx="2">
-                <a:schemeClr val="accent1">
-                  <a:shade val="50000"/>
-                </a:schemeClr>
-              </a:lnRef>
-              <a:fillRef idx="1">
-                <a:schemeClr val="accent1"/>
-              </a:fillRef>
-              <a:effectRef idx="0">
-                <a:schemeClr val="accent1"/>
-              </a:effectRef>
-              <a:fontRef idx="minor">
-                <a:schemeClr val="lt1"/>
-              </a:fontRef>
-            </p:style>
-            <p:txBody>
-              <a:bodyPr rtlCol="0" anchor="ctr"/>
-              <a:lstStyle/>
-              <a:p>
-                <a:pPr algn="ctr"/>
-                <a:endParaRPr lang="en-US" sz="2942"/>
-              </a:p>
-            </p:txBody>
-          </p:sp>
-          <p:sp>
-            <p:nvSpPr>
-              <p:cNvPr id="9" name="Oval 8">
-                <a:extLst>
-                  <a:ext uri="{FF2B5EF4-FFF2-40B4-BE49-F238E27FC236}">
-                    <a16:creationId xmlns:a16="http://schemas.microsoft.com/office/drawing/2014/main" id="{B6E2B30B-17EE-446A-AAC5-2132B4C69130}"/>
-                  </a:ext>
-                </a:extLst>
-              </p:cNvPr>
-              <p:cNvSpPr/>
-              <p:nvPr/>
-            </p:nvSpPr>
-            <p:spPr>
-              <a:xfrm>
-                <a:off x="3198396" y="2934704"/>
-                <a:ext cx="104274" cy="112294"/>
-              </a:xfrm>
-              <a:prstGeom prst="ellipse">
-                <a:avLst/>
-              </a:prstGeom>
-              <a:solidFill>
-                <a:schemeClr val="tx1"/>
-              </a:solidFill>
-              <a:ln>
-                <a:solidFill>
-                  <a:schemeClr val="tx1"/>
-                </a:solidFill>
-              </a:ln>
-            </p:spPr>
-            <p:style>
-              <a:lnRef idx="2">
-                <a:schemeClr val="accent1">
-                  <a:shade val="50000"/>
-                </a:schemeClr>
-              </a:lnRef>
-              <a:fillRef idx="1">
-                <a:schemeClr val="accent1"/>
-              </a:fillRef>
-              <a:effectRef idx="0">
-                <a:schemeClr val="accent1"/>
-              </a:effectRef>
-              <a:fontRef idx="minor">
-                <a:schemeClr val="lt1"/>
-              </a:fontRef>
-            </p:style>
-            <p:txBody>
-              <a:bodyPr rtlCol="0" anchor="ctr"/>
-              <a:lstStyle/>
-              <a:p>
-                <a:pPr algn="ctr"/>
-                <a:endParaRPr lang="en-US" sz="2942"/>
-              </a:p>
-            </p:txBody>
-          </p:sp>
-          <p:sp>
-            <p:nvSpPr>
-              <p:cNvPr id="10" name="Oval 9">
-                <a:extLst>
-                  <a:ext uri="{FF2B5EF4-FFF2-40B4-BE49-F238E27FC236}">
-                    <a16:creationId xmlns:a16="http://schemas.microsoft.com/office/drawing/2014/main" id="{6BF65A4F-EE02-4914-AE9A-020D9A347B67}"/>
-                  </a:ext>
-                </a:extLst>
-              </p:cNvPr>
-              <p:cNvSpPr/>
-              <p:nvPr/>
-            </p:nvSpPr>
-            <p:spPr>
-              <a:xfrm>
-                <a:off x="3404940" y="2934704"/>
-                <a:ext cx="104274" cy="112294"/>
-              </a:xfrm>
-              <a:prstGeom prst="ellipse">
-                <a:avLst/>
-              </a:prstGeom>
-              <a:solidFill>
-                <a:schemeClr val="tx1"/>
-              </a:solidFill>
-              <a:ln>
-                <a:solidFill>
-                  <a:schemeClr val="tx1"/>
-                </a:solidFill>
-              </a:ln>
-            </p:spPr>
-            <p:style>
-              <a:lnRef idx="2">
-                <a:schemeClr val="accent1">
-                  <a:shade val="50000"/>
-                </a:schemeClr>
-              </a:lnRef>
-              <a:fillRef idx="1">
-                <a:schemeClr val="accent1"/>
-              </a:fillRef>
-              <a:effectRef idx="0">
-                <a:schemeClr val="accent1"/>
-              </a:effectRef>
-              <a:fontRef idx="minor">
-                <a:schemeClr val="lt1"/>
-              </a:fontRef>
-            </p:style>
-            <p:txBody>
-              <a:bodyPr rtlCol="0" anchor="ctr"/>
-              <a:lstStyle/>
-              <a:p>
-                <a:pPr algn="ctr"/>
-                <a:endParaRPr lang="en-US" sz="2942"/>
-              </a:p>
-            </p:txBody>
-          </p:sp>
-          <p:sp>
-            <p:nvSpPr>
-              <p:cNvPr id="11" name="Oval 10">
-                <a:extLst>
-                  <a:ext uri="{FF2B5EF4-FFF2-40B4-BE49-F238E27FC236}">
-                    <a16:creationId xmlns:a16="http://schemas.microsoft.com/office/drawing/2014/main" id="{668BC520-59D3-45B8-AF20-A1177D7D23B2}"/>
-                  </a:ext>
-                </a:extLst>
-              </p:cNvPr>
-              <p:cNvSpPr/>
-              <p:nvPr/>
-            </p:nvSpPr>
-            <p:spPr>
-              <a:xfrm>
-                <a:off x="4858754" y="2939716"/>
-                <a:ext cx="104274" cy="112294"/>
-              </a:xfrm>
-              <a:prstGeom prst="ellipse">
-                <a:avLst/>
-              </a:prstGeom>
-              <a:solidFill>
-                <a:schemeClr val="tx1"/>
-              </a:solidFill>
-              <a:ln>
-                <a:solidFill>
-                  <a:schemeClr val="tx1"/>
-                </a:solidFill>
-              </a:ln>
-            </p:spPr>
-            <p:style>
-              <a:lnRef idx="2">
-                <a:schemeClr val="accent1">
-                  <a:shade val="50000"/>
-                </a:schemeClr>
-              </a:lnRef>
-              <a:fillRef idx="1">
-                <a:schemeClr val="accent1"/>
-              </a:fillRef>
-              <a:effectRef idx="0">
-                <a:schemeClr val="accent1"/>
-              </a:effectRef>
-              <a:fontRef idx="minor">
-                <a:schemeClr val="lt1"/>
-              </a:fontRef>
-            </p:style>
-            <p:txBody>
-              <a:bodyPr rtlCol="0" anchor="ctr"/>
-              <a:lstStyle/>
-              <a:p>
-                <a:pPr algn="ctr"/>
-                <a:endParaRPr lang="en-US" sz="2942"/>
-              </a:p>
-            </p:txBody>
-          </p:sp>
-          <p:sp>
-            <p:nvSpPr>
-              <p:cNvPr id="12" name="Oval 11">
-                <a:extLst>
-                  <a:ext uri="{FF2B5EF4-FFF2-40B4-BE49-F238E27FC236}">
-                    <a16:creationId xmlns:a16="http://schemas.microsoft.com/office/drawing/2014/main" id="{B53D6C1D-FCAE-45AF-A36F-D580A4DE219E}"/>
-                  </a:ext>
-                </a:extLst>
-              </p:cNvPr>
-              <p:cNvSpPr/>
-              <p:nvPr/>
-            </p:nvSpPr>
-            <p:spPr>
-              <a:xfrm>
-                <a:off x="5388144" y="2934704"/>
-                <a:ext cx="104274" cy="112294"/>
-              </a:xfrm>
-              <a:prstGeom prst="ellipse">
-                <a:avLst/>
-              </a:prstGeom>
-              <a:solidFill>
-                <a:schemeClr val="tx1"/>
-              </a:solidFill>
-              <a:ln>
-                <a:solidFill>
-                  <a:schemeClr val="tx1"/>
-                </a:solidFill>
-              </a:ln>
-            </p:spPr>
-            <p:style>
-              <a:lnRef idx="2">
-                <a:schemeClr val="accent1">
-                  <a:shade val="50000"/>
-                </a:schemeClr>
-              </a:lnRef>
-              <a:fillRef idx="1">
-                <a:schemeClr val="accent1"/>
-              </a:fillRef>
-              <a:effectRef idx="0">
-                <a:schemeClr val="accent1"/>
-              </a:effectRef>
-              <a:fontRef idx="minor">
-                <a:schemeClr val="lt1"/>
-              </a:fontRef>
-            </p:style>
-            <p:txBody>
-              <a:bodyPr rtlCol="0" anchor="ctr"/>
-              <a:lstStyle/>
-              <a:p>
-                <a:pPr algn="ctr"/>
-                <a:endParaRPr lang="en-US" sz="2942"/>
-              </a:p>
-            </p:txBody>
-          </p:sp>
-          <p:sp>
-            <p:nvSpPr>
-              <p:cNvPr id="13" name="Oval 12">
-                <a:extLst>
-                  <a:ext uri="{FF2B5EF4-FFF2-40B4-BE49-F238E27FC236}">
-                    <a16:creationId xmlns:a16="http://schemas.microsoft.com/office/drawing/2014/main" id="{57FE6760-9852-44E6-AB31-232A1CE1100B}"/>
-                  </a:ext>
-                </a:extLst>
-              </p:cNvPr>
-              <p:cNvSpPr/>
-              <p:nvPr/>
-            </p:nvSpPr>
-            <p:spPr>
-              <a:xfrm>
-                <a:off x="6300540" y="2939716"/>
-                <a:ext cx="104274" cy="112294"/>
-              </a:xfrm>
-              <a:prstGeom prst="ellipse">
-                <a:avLst/>
-              </a:prstGeom>
-              <a:solidFill>
-                <a:schemeClr val="tx1"/>
-              </a:solidFill>
-              <a:ln>
-                <a:solidFill>
-                  <a:schemeClr val="tx1"/>
-                </a:solidFill>
-              </a:ln>
-            </p:spPr>
-            <p:style>
-              <a:lnRef idx="2">
-                <a:schemeClr val="accent1">
-                  <a:shade val="50000"/>
-                </a:schemeClr>
-              </a:lnRef>
-              <a:fillRef idx="1">
-                <a:schemeClr val="accent1"/>
-              </a:fillRef>
-              <a:effectRef idx="0">
-                <a:schemeClr val="accent1"/>
-              </a:effectRef>
-              <a:fontRef idx="minor">
-                <a:schemeClr val="lt1"/>
-              </a:fontRef>
-            </p:style>
-            <p:txBody>
-              <a:bodyPr rtlCol="0" anchor="ctr"/>
-              <a:lstStyle/>
-              <a:p>
-                <a:pPr algn="ctr"/>
-                <a:endParaRPr lang="en-US" sz="2942"/>
-              </a:p>
-            </p:txBody>
-          </p:sp>
-          <p:sp>
-            <p:nvSpPr>
-              <p:cNvPr id="14" name="Oval 13">
-                <a:extLst>
-                  <a:ext uri="{FF2B5EF4-FFF2-40B4-BE49-F238E27FC236}">
-                    <a16:creationId xmlns:a16="http://schemas.microsoft.com/office/drawing/2014/main" id="{6791E794-3177-4495-9D67-C30A5C2CEDDD}"/>
-                  </a:ext>
-                </a:extLst>
-              </p:cNvPr>
-              <p:cNvSpPr/>
-              <p:nvPr/>
-            </p:nvSpPr>
-            <p:spPr>
-              <a:xfrm>
-                <a:off x="7000375" y="2934704"/>
-                <a:ext cx="104274" cy="112294"/>
-              </a:xfrm>
-              <a:prstGeom prst="ellipse">
-                <a:avLst/>
-              </a:prstGeom>
-              <a:solidFill>
-                <a:schemeClr val="tx1"/>
-              </a:solidFill>
-              <a:ln>
-                <a:solidFill>
-                  <a:schemeClr val="tx1"/>
-                </a:solidFill>
-              </a:ln>
-            </p:spPr>
-            <p:style>
-              <a:lnRef idx="2">
-                <a:schemeClr val="accent1">
-                  <a:shade val="50000"/>
-                </a:schemeClr>
-              </a:lnRef>
-              <a:fillRef idx="1">
-                <a:schemeClr val="accent1"/>
-              </a:fillRef>
-              <a:effectRef idx="0">
-                <a:schemeClr val="accent1"/>
-              </a:effectRef>
-              <a:fontRef idx="minor">
-                <a:schemeClr val="lt1"/>
-              </a:fontRef>
-            </p:style>
-            <p:txBody>
-              <a:bodyPr rtlCol="0" anchor="ctr"/>
-              <a:lstStyle/>
-              <a:p>
-                <a:pPr algn="ctr"/>
-                <a:endParaRPr lang="en-US" sz="2942"/>
-              </a:p>
-            </p:txBody>
-          </p:sp>
-          <p:sp>
-            <p:nvSpPr>
-              <p:cNvPr id="15" name="Oval 14">
-                <a:extLst>
-                  <a:ext uri="{FF2B5EF4-FFF2-40B4-BE49-F238E27FC236}">
-                    <a16:creationId xmlns:a16="http://schemas.microsoft.com/office/drawing/2014/main" id="{BAEA3443-39D9-444D-AAB4-2F7175BC2AE8}"/>
-                  </a:ext>
-                </a:extLst>
-              </p:cNvPr>
-              <p:cNvSpPr/>
-              <p:nvPr/>
-            </p:nvSpPr>
-            <p:spPr>
-              <a:xfrm>
-                <a:off x="7912771" y="2939716"/>
-                <a:ext cx="104274" cy="112294"/>
-              </a:xfrm>
-              <a:prstGeom prst="ellipse">
-                <a:avLst/>
-              </a:prstGeom>
-              <a:solidFill>
-                <a:schemeClr val="tx1"/>
-              </a:solidFill>
-              <a:ln>
-                <a:solidFill>
-                  <a:schemeClr val="tx1"/>
-                </a:solidFill>
-              </a:ln>
-            </p:spPr>
-            <p:style>
-              <a:lnRef idx="2">
-                <a:schemeClr val="accent1">
-                  <a:shade val="50000"/>
-                </a:schemeClr>
-              </a:lnRef>
-              <a:fillRef idx="1">
-                <a:schemeClr val="accent1"/>
-              </a:fillRef>
-              <a:effectRef idx="0">
-                <a:schemeClr val="accent1"/>
-              </a:effectRef>
-              <a:fontRef idx="minor">
-                <a:schemeClr val="lt1"/>
-              </a:fontRef>
-            </p:style>
-            <p:txBody>
-              <a:bodyPr rtlCol="0" anchor="ctr"/>
-              <a:lstStyle/>
-              <a:p>
-                <a:pPr algn="ctr"/>
-                <a:endParaRPr lang="en-US" sz="2942"/>
-              </a:p>
-            </p:txBody>
-          </p:sp>
-          <p:sp>
-            <p:nvSpPr>
-              <p:cNvPr id="16" name="Oval 15">
-                <a:extLst>
-                  <a:ext uri="{FF2B5EF4-FFF2-40B4-BE49-F238E27FC236}">
-                    <a16:creationId xmlns:a16="http://schemas.microsoft.com/office/drawing/2014/main" id="{11424A3E-B71D-4339-98F2-2365FC05B448}"/>
-                  </a:ext>
-                </a:extLst>
-              </p:cNvPr>
-              <p:cNvSpPr/>
-              <p:nvPr/>
-            </p:nvSpPr>
-            <p:spPr>
-              <a:xfrm>
-                <a:off x="9895975" y="2934704"/>
-                <a:ext cx="104274" cy="112294"/>
-              </a:xfrm>
-              <a:prstGeom prst="ellipse">
-                <a:avLst/>
-              </a:prstGeom>
-              <a:solidFill>
-                <a:schemeClr val="tx1"/>
-              </a:solidFill>
-              <a:ln>
-                <a:solidFill>
-                  <a:schemeClr val="tx1"/>
-                </a:solidFill>
-              </a:ln>
-            </p:spPr>
-            <p:style>
-              <a:lnRef idx="2">
-                <a:schemeClr val="accent1">
-                  <a:shade val="50000"/>
-                </a:schemeClr>
-              </a:lnRef>
-              <a:fillRef idx="1">
-                <a:schemeClr val="accent1"/>
-              </a:fillRef>
-              <a:effectRef idx="0">
-                <a:schemeClr val="accent1"/>
-              </a:effectRef>
-              <a:fontRef idx="minor">
-                <a:schemeClr val="lt1"/>
-              </a:fontRef>
-            </p:style>
-            <p:txBody>
-              <a:bodyPr rtlCol="0" anchor="ctr"/>
-              <a:lstStyle/>
-              <a:p>
-                <a:pPr algn="ctr"/>
-                <a:endParaRPr lang="en-US" sz="2942"/>
-              </a:p>
-            </p:txBody>
-          </p:sp>
-          <p:sp>
-            <p:nvSpPr>
-              <p:cNvPr id="17" name="Oval 16">
-                <a:extLst>
-                  <a:ext uri="{FF2B5EF4-FFF2-40B4-BE49-F238E27FC236}">
-                    <a16:creationId xmlns:a16="http://schemas.microsoft.com/office/drawing/2014/main" id="{304FA3B0-09F4-45FD-800A-47CE0B222012}"/>
-                  </a:ext>
-                </a:extLst>
-              </p:cNvPr>
-              <p:cNvSpPr/>
-              <p:nvPr/>
-            </p:nvSpPr>
-            <p:spPr>
-              <a:xfrm>
-                <a:off x="10248902" y="2934704"/>
-                <a:ext cx="104274" cy="112294"/>
-              </a:xfrm>
-              <a:prstGeom prst="ellipse">
-                <a:avLst/>
-              </a:prstGeom>
-              <a:solidFill>
-                <a:schemeClr val="tx1"/>
-              </a:solidFill>
-              <a:ln>
-                <a:solidFill>
-                  <a:schemeClr val="tx1"/>
-                </a:solidFill>
-              </a:ln>
-            </p:spPr>
-            <p:style>
-              <a:lnRef idx="2">
-                <a:schemeClr val="accent1">
-                  <a:shade val="50000"/>
-                </a:schemeClr>
-              </a:lnRef>
-              <a:fillRef idx="1">
-                <a:schemeClr val="accent1"/>
-              </a:fillRef>
-              <a:effectRef idx="0">
-                <a:schemeClr val="accent1"/>
-              </a:effectRef>
-              <a:fontRef idx="minor">
-                <a:schemeClr val="lt1"/>
-              </a:fontRef>
-            </p:style>
-            <p:txBody>
-              <a:bodyPr rtlCol="0" anchor="ctr"/>
-              <a:lstStyle/>
-              <a:p>
-                <a:pPr algn="ctr"/>
-                <a:endParaRPr lang="en-US" sz="2942"/>
-              </a:p>
-            </p:txBody>
-          </p:sp>
-          <p:sp>
-            <p:nvSpPr>
-              <p:cNvPr id="18" name="Oval 17">
-                <a:extLst>
-                  <a:ext uri="{FF2B5EF4-FFF2-40B4-BE49-F238E27FC236}">
-                    <a16:creationId xmlns:a16="http://schemas.microsoft.com/office/drawing/2014/main" id="{9006FAB6-6A46-49FF-ABD8-492628C15C4C}"/>
-                  </a:ext>
-                </a:extLst>
-              </p:cNvPr>
-              <p:cNvSpPr/>
-              <p:nvPr/>
-            </p:nvSpPr>
-            <p:spPr>
-              <a:xfrm>
-                <a:off x="10808371" y="2939716"/>
-                <a:ext cx="104274" cy="112294"/>
-              </a:xfrm>
-              <a:prstGeom prst="ellipse">
-                <a:avLst/>
-              </a:prstGeom>
-              <a:solidFill>
-                <a:schemeClr val="tx1"/>
-              </a:solidFill>
-              <a:ln>
-                <a:solidFill>
-                  <a:schemeClr val="tx1"/>
-                </a:solidFill>
-              </a:ln>
-            </p:spPr>
-            <p:style>
-              <a:lnRef idx="2">
-                <a:schemeClr val="accent1">
-                  <a:shade val="50000"/>
-                </a:schemeClr>
-              </a:lnRef>
-              <a:fillRef idx="1">
-                <a:schemeClr val="accent1"/>
-              </a:fillRef>
-              <a:effectRef idx="0">
-                <a:schemeClr val="accent1"/>
-              </a:effectRef>
-              <a:fontRef idx="minor">
-                <a:schemeClr val="lt1"/>
-              </a:fontRef>
-            </p:style>
-            <p:txBody>
-              <a:bodyPr rtlCol="0" anchor="ctr"/>
-              <a:lstStyle/>
-              <a:p>
-                <a:pPr algn="ctr"/>
-                <a:endParaRPr lang="en-US" sz="2942"/>
-              </a:p>
-            </p:txBody>
-          </p:sp>
-          <p:sp>
-            <p:nvSpPr>
-              <p:cNvPr id="19" name="TextBox 18">
-                <a:extLst>
-                  <a:ext uri="{FF2B5EF4-FFF2-40B4-BE49-F238E27FC236}">
-                    <a16:creationId xmlns:a16="http://schemas.microsoft.com/office/drawing/2014/main" id="{B532F833-E8AC-49DC-920A-FF74F458A339}"/>
-                  </a:ext>
-                </a:extLst>
-              </p:cNvPr>
-              <p:cNvSpPr txBox="1"/>
-              <p:nvPr/>
-            </p:nvSpPr>
-            <p:spPr>
-              <a:xfrm>
-                <a:off x="1274164" y="3006106"/>
-                <a:ext cx="1624760" cy="308163"/>
-              </a:xfrm>
-              <a:prstGeom prst="rect">
-                <a:avLst/>
-              </a:prstGeom>
-              <a:noFill/>
-            </p:spPr>
-            <p:txBody>
-              <a:bodyPr wrap="square" rtlCol="0">
-                <a:spAutoFit/>
-              </a:bodyPr>
-              <a:lstStyle/>
-              <a:p>
-                <a:r>
-                  <a:rPr lang="en-US" sz="2386" dirty="0"/>
-                  <a:t>1950s-1970s</a:t>
-                </a:r>
-              </a:p>
-            </p:txBody>
-          </p:sp>
-          <p:sp>
-            <p:nvSpPr>
-              <p:cNvPr id="21" name="TextBox 20">
-                <a:extLst>
-                  <a:ext uri="{FF2B5EF4-FFF2-40B4-BE49-F238E27FC236}">
-                    <a16:creationId xmlns:a16="http://schemas.microsoft.com/office/drawing/2014/main" id="{3EF45AC3-5E30-4DED-820C-ACBF39BE8D60}"/>
-                  </a:ext>
-                </a:extLst>
-              </p:cNvPr>
-              <p:cNvSpPr txBox="1"/>
-              <p:nvPr/>
-            </p:nvSpPr>
-            <p:spPr>
-              <a:xfrm rot="2668846">
-                <a:off x="2724224" y="2642731"/>
-                <a:ext cx="699835" cy="308163"/>
-              </a:xfrm>
-              <a:prstGeom prst="rect">
-                <a:avLst/>
-              </a:prstGeom>
-              <a:noFill/>
-            </p:spPr>
-            <p:txBody>
-              <a:bodyPr wrap="square" rtlCol="0">
-                <a:spAutoFit/>
-              </a:bodyPr>
-              <a:lstStyle/>
-              <a:p>
-                <a:r>
-                  <a:rPr lang="en-US" sz="2386" dirty="0"/>
-                  <a:t>1979</a:t>
-                </a:r>
-              </a:p>
-            </p:txBody>
-          </p:sp>
-          <p:sp>
-            <p:nvSpPr>
-              <p:cNvPr id="22" name="TextBox 21">
-                <a:extLst>
-                  <a:ext uri="{FF2B5EF4-FFF2-40B4-BE49-F238E27FC236}">
-                    <a16:creationId xmlns:a16="http://schemas.microsoft.com/office/drawing/2014/main" id="{06F491C6-B1CA-411B-B897-48388AF483E9}"/>
-                  </a:ext>
-                </a:extLst>
-              </p:cNvPr>
-              <p:cNvSpPr txBox="1"/>
-              <p:nvPr/>
-            </p:nvSpPr>
-            <p:spPr>
-              <a:xfrm rot="18960263">
-                <a:off x="3169683" y="3041970"/>
-                <a:ext cx="699835" cy="308163"/>
-              </a:xfrm>
-              <a:prstGeom prst="rect">
-                <a:avLst/>
-              </a:prstGeom>
-              <a:noFill/>
-            </p:spPr>
-            <p:txBody>
-              <a:bodyPr wrap="square" rtlCol="0">
-                <a:spAutoFit/>
-              </a:bodyPr>
-              <a:lstStyle/>
-              <a:p>
-                <a:r>
-                  <a:rPr lang="en-US" sz="2386" dirty="0"/>
-                  <a:t>1980</a:t>
-                </a:r>
-              </a:p>
-            </p:txBody>
-          </p:sp>
-          <p:sp>
-            <p:nvSpPr>
-              <p:cNvPr id="23" name="TextBox 22">
-                <a:extLst>
-                  <a:ext uri="{FF2B5EF4-FFF2-40B4-BE49-F238E27FC236}">
-                    <a16:creationId xmlns:a16="http://schemas.microsoft.com/office/drawing/2014/main" id="{1DF75E0E-0DDA-4AB7-AA05-97BDF0565E6A}"/>
-                  </a:ext>
-                </a:extLst>
-              </p:cNvPr>
-              <p:cNvSpPr txBox="1"/>
-              <p:nvPr/>
-            </p:nvSpPr>
-            <p:spPr>
-              <a:xfrm rot="18960263">
-                <a:off x="4395201" y="3031527"/>
-                <a:ext cx="699835" cy="308163"/>
-              </a:xfrm>
-              <a:prstGeom prst="rect">
-                <a:avLst/>
-              </a:prstGeom>
-              <a:noFill/>
-            </p:spPr>
-            <p:txBody>
-              <a:bodyPr wrap="square" rtlCol="0">
-                <a:spAutoFit/>
-              </a:bodyPr>
-              <a:lstStyle/>
-              <a:p>
-                <a:r>
-                  <a:rPr lang="en-US" sz="2386" dirty="0"/>
-                  <a:t>1988</a:t>
-                </a:r>
-              </a:p>
-            </p:txBody>
-          </p:sp>
-          <p:sp>
-            <p:nvSpPr>
-              <p:cNvPr id="25" name="TextBox 24">
-                <a:extLst>
-                  <a:ext uri="{FF2B5EF4-FFF2-40B4-BE49-F238E27FC236}">
-                    <a16:creationId xmlns:a16="http://schemas.microsoft.com/office/drawing/2014/main" id="{3C3091AC-CF78-4E2E-BF0D-16F0724C789F}"/>
-                  </a:ext>
-                </a:extLst>
-              </p:cNvPr>
-              <p:cNvSpPr txBox="1"/>
-              <p:nvPr/>
-            </p:nvSpPr>
-            <p:spPr>
-              <a:xfrm rot="18960263">
-                <a:off x="5865062" y="3031524"/>
-                <a:ext cx="699835" cy="308163"/>
-              </a:xfrm>
-              <a:prstGeom prst="rect">
-                <a:avLst/>
-              </a:prstGeom>
-              <a:noFill/>
-            </p:spPr>
-            <p:txBody>
-              <a:bodyPr wrap="square" rtlCol="0">
-                <a:spAutoFit/>
-              </a:bodyPr>
-              <a:lstStyle/>
-              <a:p>
-                <a:r>
-                  <a:rPr lang="en-US" sz="2386" dirty="0"/>
-                  <a:t>1996</a:t>
-                </a:r>
-              </a:p>
-            </p:txBody>
-          </p:sp>
-          <p:sp>
-            <p:nvSpPr>
-              <p:cNvPr id="27" name="TextBox 26">
-                <a:extLst>
-                  <a:ext uri="{FF2B5EF4-FFF2-40B4-BE49-F238E27FC236}">
-                    <a16:creationId xmlns:a16="http://schemas.microsoft.com/office/drawing/2014/main" id="{9B690569-2846-46D1-AB5A-70BE3A51595C}"/>
-                  </a:ext>
-                </a:extLst>
-              </p:cNvPr>
-              <p:cNvSpPr txBox="1"/>
-              <p:nvPr/>
-            </p:nvSpPr>
-            <p:spPr>
-              <a:xfrm rot="18960263">
-                <a:off x="7485317" y="3045297"/>
-                <a:ext cx="699835" cy="308163"/>
-              </a:xfrm>
-              <a:prstGeom prst="rect">
-                <a:avLst/>
-              </a:prstGeom>
-              <a:noFill/>
-            </p:spPr>
-            <p:txBody>
-              <a:bodyPr wrap="square" rtlCol="0">
-                <a:spAutoFit/>
-              </a:bodyPr>
-              <a:lstStyle/>
-              <a:p>
-                <a:r>
-                  <a:rPr lang="en-US" sz="2386" dirty="0"/>
-                  <a:t>2005</a:t>
-                </a:r>
-              </a:p>
-            </p:txBody>
-          </p:sp>
-          <p:sp>
-            <p:nvSpPr>
-              <p:cNvPr id="30" name="TextBox 29">
-                <a:extLst>
-                  <a:ext uri="{FF2B5EF4-FFF2-40B4-BE49-F238E27FC236}">
-                    <a16:creationId xmlns:a16="http://schemas.microsoft.com/office/drawing/2014/main" id="{64E4B1B7-24D1-42BD-953A-145EC3781505}"/>
-                  </a:ext>
-                </a:extLst>
-              </p:cNvPr>
-              <p:cNvSpPr txBox="1"/>
-              <p:nvPr/>
-            </p:nvSpPr>
-            <p:spPr>
-              <a:xfrm rot="18960263">
-                <a:off x="10399462" y="3041971"/>
-                <a:ext cx="699835" cy="308163"/>
-              </a:xfrm>
-              <a:prstGeom prst="rect">
-                <a:avLst/>
-              </a:prstGeom>
-              <a:noFill/>
-            </p:spPr>
-            <p:txBody>
-              <a:bodyPr wrap="square" rtlCol="0">
-                <a:spAutoFit/>
-              </a:bodyPr>
-              <a:lstStyle/>
-              <a:p>
-                <a:r>
-                  <a:rPr lang="en-US" sz="2386" dirty="0"/>
-                  <a:t>2021</a:t>
-                </a:r>
-              </a:p>
-            </p:txBody>
-          </p:sp>
-          <p:sp>
-            <p:nvSpPr>
-              <p:cNvPr id="32" name="TextBox 31">
-                <a:extLst>
-                  <a:ext uri="{FF2B5EF4-FFF2-40B4-BE49-F238E27FC236}">
-                    <a16:creationId xmlns:a16="http://schemas.microsoft.com/office/drawing/2014/main" id="{BF92D5CA-13AF-4124-98D4-A63CFB322EA9}"/>
-                  </a:ext>
-                </a:extLst>
-              </p:cNvPr>
-              <p:cNvSpPr txBox="1"/>
-              <p:nvPr/>
-            </p:nvSpPr>
-            <p:spPr>
-              <a:xfrm>
-                <a:off x="291276" y="2453897"/>
-                <a:ext cx="1924233" cy="492733"/>
-              </a:xfrm>
-              <a:prstGeom prst="rect">
-                <a:avLst/>
-              </a:prstGeom>
-              <a:noFill/>
-            </p:spPr>
-            <p:txBody>
-              <a:bodyPr wrap="square" rtlCol="0">
-                <a:spAutoFit/>
-              </a:bodyPr>
-              <a:lstStyle/>
-              <a:p>
-                <a:pPr algn="ctr"/>
-                <a:r>
-                  <a:rPr lang="en-US" sz="2087" dirty="0"/>
-                  <a:t>Start of the </a:t>
-                </a:r>
-              </a:p>
-              <a:p>
-                <a:pPr algn="ctr"/>
-                <a:r>
-                  <a:rPr lang="en-US" sz="2087" dirty="0"/>
-                  <a:t>Great Acceleration</a:t>
-                </a:r>
-              </a:p>
-            </p:txBody>
-          </p:sp>
-          <p:sp>
-            <p:nvSpPr>
-              <p:cNvPr id="33" name="TextBox 32">
-                <a:extLst>
-                  <a:ext uri="{FF2B5EF4-FFF2-40B4-BE49-F238E27FC236}">
-                    <a16:creationId xmlns:a16="http://schemas.microsoft.com/office/drawing/2014/main" id="{AE843DE8-31A2-4898-8D23-54CECBB7D140}"/>
-                  </a:ext>
-                </a:extLst>
-              </p:cNvPr>
-              <p:cNvSpPr txBox="1"/>
-              <p:nvPr/>
-            </p:nvSpPr>
-            <p:spPr>
-              <a:xfrm>
-                <a:off x="2277689" y="3493875"/>
-                <a:ext cx="1268179" cy="708137"/>
-              </a:xfrm>
-              <a:prstGeom prst="rect">
-                <a:avLst/>
-              </a:prstGeom>
-              <a:noFill/>
-            </p:spPr>
-            <p:txBody>
-              <a:bodyPr wrap="square" rtlCol="0">
-                <a:spAutoFit/>
-              </a:bodyPr>
-              <a:lstStyle/>
-              <a:p>
-                <a:pPr algn="ctr"/>
-                <a:r>
-                  <a:rPr lang="it-IT" sz="2087" dirty="0"/>
-                  <a:t>UN/ECE LRTAP Sulphur Protocols</a:t>
-                </a:r>
-                <a:endParaRPr lang="en-US" sz="2087" dirty="0"/>
-              </a:p>
-            </p:txBody>
-          </p:sp>
-          <p:sp>
-            <p:nvSpPr>
-              <p:cNvPr id="34" name="TextBox 33">
-                <a:extLst>
-                  <a:ext uri="{FF2B5EF4-FFF2-40B4-BE49-F238E27FC236}">
-                    <a16:creationId xmlns:a16="http://schemas.microsoft.com/office/drawing/2014/main" id="{18AA36F2-565F-4F96-A5A2-3792A38BC886}"/>
-                  </a:ext>
-                </a:extLst>
-              </p:cNvPr>
-              <p:cNvSpPr txBox="1"/>
-              <p:nvPr/>
-            </p:nvSpPr>
-            <p:spPr>
-              <a:xfrm>
-                <a:off x="2960258" y="2245415"/>
-                <a:ext cx="1229729" cy="492733"/>
-              </a:xfrm>
-              <a:prstGeom prst="rect">
-                <a:avLst/>
-              </a:prstGeom>
-              <a:noFill/>
-            </p:spPr>
-            <p:txBody>
-              <a:bodyPr wrap="square" rtlCol="0">
-                <a:spAutoFit/>
-              </a:bodyPr>
-              <a:lstStyle/>
-              <a:p>
-                <a:pPr algn="ctr"/>
-                <a:r>
-                  <a:rPr lang="en-US" sz="2087" dirty="0"/>
-                  <a:t>Peak acidification</a:t>
-                </a:r>
-              </a:p>
-            </p:txBody>
-          </p:sp>
-          <p:sp>
-            <p:nvSpPr>
-              <p:cNvPr id="35" name="TextBox 34">
-                <a:extLst>
-                  <a:ext uri="{FF2B5EF4-FFF2-40B4-BE49-F238E27FC236}">
-                    <a16:creationId xmlns:a16="http://schemas.microsoft.com/office/drawing/2014/main" id="{B8892350-487C-4901-9129-D197A7705679}"/>
-                  </a:ext>
-                </a:extLst>
-              </p:cNvPr>
-              <p:cNvSpPr txBox="1"/>
-              <p:nvPr/>
-            </p:nvSpPr>
-            <p:spPr>
-              <a:xfrm>
-                <a:off x="3976598" y="1859127"/>
-                <a:ext cx="1852036" cy="492733"/>
-              </a:xfrm>
-              <a:prstGeom prst="rect">
-                <a:avLst/>
-              </a:prstGeom>
-              <a:noFill/>
-            </p:spPr>
-            <p:txBody>
-              <a:bodyPr wrap="square" rtlCol="0">
-                <a:spAutoFit/>
-              </a:bodyPr>
-              <a:lstStyle/>
-              <a:p>
-                <a:pPr algn="ctr"/>
-                <a:r>
-                  <a:rPr lang="en-US" sz="2087" dirty="0"/>
-                  <a:t>Peak EU use of </a:t>
-                </a:r>
-              </a:p>
-              <a:p>
-                <a:pPr algn="ctr"/>
-                <a:r>
-                  <a:rPr lang="en-US" sz="2087" dirty="0"/>
-                  <a:t>N and P fertilizers</a:t>
-                </a:r>
-              </a:p>
-            </p:txBody>
-          </p:sp>
-          <p:sp>
-            <p:nvSpPr>
-              <p:cNvPr id="37" name="TextBox 36">
-                <a:extLst>
-                  <a:ext uri="{FF2B5EF4-FFF2-40B4-BE49-F238E27FC236}">
-                    <a16:creationId xmlns:a16="http://schemas.microsoft.com/office/drawing/2014/main" id="{EA810D53-F0DC-4857-81D3-975AB5EAA3DE}"/>
-                  </a:ext>
-                </a:extLst>
-              </p:cNvPr>
-              <p:cNvSpPr txBox="1"/>
-              <p:nvPr/>
-            </p:nvSpPr>
-            <p:spPr>
-              <a:xfrm>
-                <a:off x="5755233" y="1820844"/>
-                <a:ext cx="1365308" cy="708137"/>
-              </a:xfrm>
-              <a:prstGeom prst="rect">
-                <a:avLst/>
-              </a:prstGeom>
-              <a:noFill/>
-            </p:spPr>
-            <p:txBody>
-              <a:bodyPr wrap="square" rtlCol="0">
-                <a:spAutoFit/>
-              </a:bodyPr>
-              <a:lstStyle/>
-              <a:p>
-                <a:pPr algn="ctr"/>
-                <a:r>
-                  <a:rPr lang="en-US" sz="2087" dirty="0"/>
-                  <a:t>Peak alien species introduction</a:t>
-                </a:r>
-              </a:p>
-            </p:txBody>
-          </p:sp>
-          <p:sp>
-            <p:nvSpPr>
-              <p:cNvPr id="38" name="TextBox 37">
-                <a:extLst>
-                  <a:ext uri="{FF2B5EF4-FFF2-40B4-BE49-F238E27FC236}">
-                    <a16:creationId xmlns:a16="http://schemas.microsoft.com/office/drawing/2014/main" id="{F7A38FFC-E335-49C8-BBE4-46FFD866D0B2}"/>
-                  </a:ext>
-                </a:extLst>
-              </p:cNvPr>
-              <p:cNvSpPr txBox="1"/>
-              <p:nvPr/>
-            </p:nvSpPr>
-            <p:spPr>
-              <a:xfrm>
-                <a:off x="6222949" y="3493875"/>
-                <a:ext cx="1527710" cy="708137"/>
-              </a:xfrm>
-              <a:prstGeom prst="rect">
-                <a:avLst/>
-              </a:prstGeom>
-              <a:noFill/>
-            </p:spPr>
-            <p:txBody>
-              <a:bodyPr wrap="square" rtlCol="0">
-                <a:spAutoFit/>
-              </a:bodyPr>
-              <a:lstStyle/>
-              <a:p>
-                <a:pPr algn="ctr"/>
-                <a:r>
-                  <a:rPr lang="en-US" sz="2087" dirty="0"/>
-                  <a:t>EU Water Framework Directive</a:t>
-                </a:r>
-              </a:p>
-            </p:txBody>
-          </p:sp>
-          <p:sp>
-            <p:nvSpPr>
-              <p:cNvPr id="39" name="TextBox 38">
-                <a:extLst>
-                  <a:ext uri="{FF2B5EF4-FFF2-40B4-BE49-F238E27FC236}">
-                    <a16:creationId xmlns:a16="http://schemas.microsoft.com/office/drawing/2014/main" id="{B9ABB514-94CA-45C8-BBD6-ABB203FF5EF0}"/>
-                  </a:ext>
-                </a:extLst>
-              </p:cNvPr>
-              <p:cNvSpPr txBox="1"/>
-              <p:nvPr/>
-            </p:nvSpPr>
-            <p:spPr>
-              <a:xfrm>
-                <a:off x="7265810" y="1936971"/>
-                <a:ext cx="1109640" cy="708137"/>
-              </a:xfrm>
-              <a:prstGeom prst="rect">
-                <a:avLst/>
-              </a:prstGeom>
-              <a:noFill/>
-            </p:spPr>
-            <p:txBody>
-              <a:bodyPr wrap="square" rtlCol="0">
-                <a:spAutoFit/>
-              </a:bodyPr>
-              <a:lstStyle/>
-              <a:p>
-                <a:pPr algn="ctr"/>
-                <a:r>
-                  <a:rPr lang="en-US" sz="2087" dirty="0"/>
-                  <a:t>New neonics authorized in Europe</a:t>
-                </a:r>
-              </a:p>
-            </p:txBody>
-          </p:sp>
-          <p:sp>
-            <p:nvSpPr>
-              <p:cNvPr id="40" name="TextBox 39">
-                <a:extLst>
-                  <a:ext uri="{FF2B5EF4-FFF2-40B4-BE49-F238E27FC236}">
-                    <a16:creationId xmlns:a16="http://schemas.microsoft.com/office/drawing/2014/main" id="{B955C533-6643-44F9-B6FD-809DEBFE3D78}"/>
-                  </a:ext>
-                </a:extLst>
-              </p:cNvPr>
-              <p:cNvSpPr txBox="1"/>
-              <p:nvPr/>
-            </p:nvSpPr>
-            <p:spPr>
-              <a:xfrm>
-                <a:off x="9205464" y="3269650"/>
-                <a:ext cx="994239" cy="708137"/>
-              </a:xfrm>
-              <a:prstGeom prst="rect">
-                <a:avLst/>
-              </a:prstGeom>
-              <a:noFill/>
-            </p:spPr>
-            <p:txBody>
-              <a:bodyPr wrap="square" rtlCol="0">
-                <a:spAutoFit/>
-              </a:bodyPr>
-              <a:lstStyle/>
-              <a:p>
-                <a:pPr algn="ctr"/>
-                <a:r>
-                  <a:rPr lang="en-US" sz="2087" dirty="0"/>
-                  <a:t>Paris Climate Accord</a:t>
-                </a:r>
-              </a:p>
-            </p:txBody>
-          </p:sp>
-          <p:sp>
-            <p:nvSpPr>
-              <p:cNvPr id="41" name="TextBox 40">
-                <a:extLst>
-                  <a:ext uri="{FF2B5EF4-FFF2-40B4-BE49-F238E27FC236}">
-                    <a16:creationId xmlns:a16="http://schemas.microsoft.com/office/drawing/2014/main" id="{BAAF337C-FEFD-4DFE-976A-8B879F0D791D}"/>
-                  </a:ext>
-                </a:extLst>
-              </p:cNvPr>
-              <p:cNvSpPr txBox="1"/>
-              <p:nvPr/>
-            </p:nvSpPr>
-            <p:spPr>
-              <a:xfrm>
-                <a:off x="9865540" y="3489193"/>
-                <a:ext cx="1482016" cy="708137"/>
-              </a:xfrm>
-              <a:prstGeom prst="rect">
-                <a:avLst/>
-              </a:prstGeom>
-              <a:noFill/>
-            </p:spPr>
-            <p:txBody>
-              <a:bodyPr wrap="square" rtlCol="0">
-                <a:spAutoFit/>
-              </a:bodyPr>
-              <a:lstStyle/>
-              <a:p>
-                <a:pPr algn="ctr"/>
-                <a:r>
-                  <a:rPr lang="en-US" sz="2087" dirty="0"/>
-                  <a:t>EU Strategy for Plastics in a Circular Economy</a:t>
-                </a:r>
-              </a:p>
-            </p:txBody>
-          </p:sp>
-          <p:sp>
-            <p:nvSpPr>
-              <p:cNvPr id="42" name="TextBox 41">
-                <a:extLst>
-                  <a:ext uri="{FF2B5EF4-FFF2-40B4-BE49-F238E27FC236}">
-                    <a16:creationId xmlns:a16="http://schemas.microsoft.com/office/drawing/2014/main" id="{2F9592A5-EADE-4E74-8D2E-CAE565D75920}"/>
-                  </a:ext>
-                </a:extLst>
-              </p:cNvPr>
-              <p:cNvSpPr txBox="1"/>
-              <p:nvPr/>
-            </p:nvSpPr>
-            <p:spPr>
-              <a:xfrm>
-                <a:off x="10410200" y="2073066"/>
-                <a:ext cx="927478" cy="708137"/>
-              </a:xfrm>
-              <a:prstGeom prst="rect">
-                <a:avLst/>
-              </a:prstGeom>
-              <a:noFill/>
-            </p:spPr>
-            <p:txBody>
-              <a:bodyPr wrap="square" rtlCol="0">
-                <a:spAutoFit/>
-              </a:bodyPr>
-              <a:lstStyle/>
-              <a:p>
-                <a:pPr algn="ctr"/>
-                <a:r>
-                  <a:rPr lang="en-US" sz="2087" dirty="0"/>
-                  <a:t>Hottest European summer</a:t>
-                </a:r>
-              </a:p>
-            </p:txBody>
-          </p:sp>
-          <p:cxnSp>
-            <p:nvCxnSpPr>
-              <p:cNvPr id="43" name="Straight Connector 42">
-                <a:extLst>
-                  <a:ext uri="{FF2B5EF4-FFF2-40B4-BE49-F238E27FC236}">
-                    <a16:creationId xmlns:a16="http://schemas.microsoft.com/office/drawing/2014/main" id="{2BDC7F6E-5728-4BE2-BDFD-83BC491A6F80}"/>
-                  </a:ext>
-                </a:extLst>
-              </p:cNvPr>
-              <p:cNvCxnSpPr>
-                <a:cxnSpLocks/>
-              </p:cNvCxnSpPr>
-              <p:nvPr/>
-            </p:nvCxnSpPr>
-            <p:spPr>
-              <a:xfrm flipV="1">
-                <a:off x="3249802" y="2979662"/>
-                <a:ext cx="410" cy="524418"/>
-              </a:xfrm>
-              <a:prstGeom prst="line">
-                <a:avLst/>
-              </a:prstGeom>
-              <a:ln w="25400">
-                <a:solidFill>
-                  <a:schemeClr val="tx1"/>
-                </a:solidFill>
-              </a:ln>
-            </p:spPr>
-            <p:style>
-              <a:lnRef idx="1">
-                <a:schemeClr val="dk1"/>
-              </a:lnRef>
-              <a:fillRef idx="0">
-                <a:schemeClr val="dk1"/>
-              </a:fillRef>
-              <a:effectRef idx="0">
-                <a:schemeClr val="dk1"/>
-              </a:effectRef>
-              <a:fontRef idx="minor">
-                <a:schemeClr val="tx1"/>
-              </a:fontRef>
-            </p:style>
-          </p:cxnSp>
-          <p:cxnSp>
-            <p:nvCxnSpPr>
-              <p:cNvPr id="47" name="Straight Connector 46">
-                <a:extLst>
-                  <a:ext uri="{FF2B5EF4-FFF2-40B4-BE49-F238E27FC236}">
-                    <a16:creationId xmlns:a16="http://schemas.microsoft.com/office/drawing/2014/main" id="{6AF4437F-2910-4465-BEA1-0D73347A7A56}"/>
-                  </a:ext>
-                </a:extLst>
-              </p:cNvPr>
-              <p:cNvCxnSpPr>
-                <a:cxnSpLocks/>
-              </p:cNvCxnSpPr>
-              <p:nvPr/>
-            </p:nvCxnSpPr>
-            <p:spPr>
-              <a:xfrm flipH="1" flipV="1">
-                <a:off x="4902926" y="2322348"/>
-                <a:ext cx="1" cy="686308"/>
-              </a:xfrm>
-              <a:prstGeom prst="line">
-                <a:avLst/>
-              </a:prstGeom>
-              <a:ln w="25400">
-                <a:solidFill>
-                  <a:schemeClr val="tx1"/>
-                </a:solidFill>
-              </a:ln>
-            </p:spPr>
-            <p:style>
-              <a:lnRef idx="1">
-                <a:schemeClr val="dk1"/>
-              </a:lnRef>
-              <a:fillRef idx="0">
-                <a:schemeClr val="dk1"/>
-              </a:fillRef>
-              <a:effectRef idx="0">
-                <a:schemeClr val="dk1"/>
-              </a:effectRef>
-              <a:fontRef idx="minor">
-                <a:schemeClr val="tx1"/>
-              </a:fontRef>
-            </p:style>
-          </p:cxnSp>
-          <p:cxnSp>
-            <p:nvCxnSpPr>
-              <p:cNvPr id="51" name="Straight Connector 50">
-                <a:extLst>
-                  <a:ext uri="{FF2B5EF4-FFF2-40B4-BE49-F238E27FC236}">
-                    <a16:creationId xmlns:a16="http://schemas.microsoft.com/office/drawing/2014/main" id="{C993A555-B20B-4843-93B6-512DF04690DA}"/>
-                  </a:ext>
-                </a:extLst>
-              </p:cNvPr>
-              <p:cNvCxnSpPr>
-                <a:cxnSpLocks/>
-              </p:cNvCxnSpPr>
-              <p:nvPr/>
-            </p:nvCxnSpPr>
-            <p:spPr>
-              <a:xfrm flipV="1">
-                <a:off x="3459084" y="2729742"/>
-                <a:ext cx="0" cy="214263"/>
-              </a:xfrm>
-              <a:prstGeom prst="line">
-                <a:avLst/>
-              </a:prstGeom>
-              <a:ln w="25400">
-                <a:solidFill>
-                  <a:schemeClr val="tx1"/>
-                </a:solidFill>
-              </a:ln>
-            </p:spPr>
-            <p:style>
-              <a:lnRef idx="1">
-                <a:schemeClr val="dk1"/>
-              </a:lnRef>
-              <a:fillRef idx="0">
-                <a:schemeClr val="dk1"/>
-              </a:fillRef>
-              <a:effectRef idx="0">
-                <a:schemeClr val="dk1"/>
-              </a:effectRef>
-              <a:fontRef idx="minor">
-                <a:schemeClr val="tx1"/>
-              </a:fontRef>
-            </p:style>
-          </p:cxnSp>
-          <p:cxnSp>
-            <p:nvCxnSpPr>
-              <p:cNvPr id="53" name="Straight Connector 52">
-                <a:extLst>
-                  <a:ext uri="{FF2B5EF4-FFF2-40B4-BE49-F238E27FC236}">
-                    <a16:creationId xmlns:a16="http://schemas.microsoft.com/office/drawing/2014/main" id="{5986060C-6337-43E1-9D98-E0CA67AB3020}"/>
-                  </a:ext>
-                </a:extLst>
-              </p:cNvPr>
-              <p:cNvCxnSpPr>
-                <a:cxnSpLocks/>
-              </p:cNvCxnSpPr>
-              <p:nvPr/>
-            </p:nvCxnSpPr>
-            <p:spPr>
-              <a:xfrm flipH="1" flipV="1">
-                <a:off x="6345384" y="2504243"/>
-                <a:ext cx="2267" cy="459037"/>
-              </a:xfrm>
-              <a:prstGeom prst="line">
-                <a:avLst/>
-              </a:prstGeom>
-              <a:ln w="25400">
-                <a:solidFill>
-                  <a:schemeClr val="tx1"/>
-                </a:solidFill>
-              </a:ln>
-            </p:spPr>
-            <p:style>
-              <a:lnRef idx="1">
-                <a:schemeClr val="dk1"/>
-              </a:lnRef>
-              <a:fillRef idx="0">
-                <a:schemeClr val="dk1"/>
-              </a:fillRef>
-              <a:effectRef idx="0">
-                <a:schemeClr val="dk1"/>
-              </a:effectRef>
-              <a:fontRef idx="minor">
-                <a:schemeClr val="tx1"/>
-              </a:fontRef>
-            </p:style>
-          </p:cxnSp>
-          <p:cxnSp>
-            <p:nvCxnSpPr>
-              <p:cNvPr id="60" name="Straight Connector 59">
-                <a:extLst>
-                  <a:ext uri="{FF2B5EF4-FFF2-40B4-BE49-F238E27FC236}">
-                    <a16:creationId xmlns:a16="http://schemas.microsoft.com/office/drawing/2014/main" id="{52D67A49-1FC8-4C1A-8C1B-809C16388B5F}"/>
-                  </a:ext>
-                </a:extLst>
-              </p:cNvPr>
-              <p:cNvCxnSpPr>
-                <a:cxnSpLocks/>
-              </p:cNvCxnSpPr>
-              <p:nvPr/>
-            </p:nvCxnSpPr>
-            <p:spPr>
-              <a:xfrm flipV="1">
-                <a:off x="7964908" y="2667406"/>
-                <a:ext cx="0" cy="293726"/>
-              </a:xfrm>
-              <a:prstGeom prst="line">
-                <a:avLst/>
-              </a:prstGeom>
-              <a:ln w="25400">
-                <a:solidFill>
-                  <a:schemeClr val="tx1"/>
-                </a:solidFill>
-              </a:ln>
-            </p:spPr>
-            <p:style>
-              <a:lnRef idx="1">
-                <a:schemeClr val="dk1"/>
-              </a:lnRef>
-              <a:fillRef idx="0">
-                <a:schemeClr val="dk1"/>
-              </a:fillRef>
-              <a:effectRef idx="0">
-                <a:schemeClr val="dk1"/>
-              </a:effectRef>
-              <a:fontRef idx="minor">
-                <a:schemeClr val="tx1"/>
-              </a:fontRef>
-            </p:style>
-          </p:cxnSp>
-          <p:cxnSp>
-            <p:nvCxnSpPr>
-              <p:cNvPr id="63" name="Straight Connector 62">
-                <a:extLst>
-                  <a:ext uri="{FF2B5EF4-FFF2-40B4-BE49-F238E27FC236}">
-                    <a16:creationId xmlns:a16="http://schemas.microsoft.com/office/drawing/2014/main" id="{7F3EA0FB-AEBE-4D76-9096-8221456E2C5B}"/>
-                  </a:ext>
-                </a:extLst>
-              </p:cNvPr>
-              <p:cNvCxnSpPr>
-                <a:cxnSpLocks/>
-              </p:cNvCxnSpPr>
-              <p:nvPr/>
-            </p:nvCxnSpPr>
-            <p:spPr>
-              <a:xfrm flipV="1">
-                <a:off x="10860508" y="2739237"/>
-                <a:ext cx="0" cy="214263"/>
-              </a:xfrm>
-              <a:prstGeom prst="line">
-                <a:avLst/>
-              </a:prstGeom>
-              <a:ln w="25400">
-                <a:solidFill>
-                  <a:schemeClr val="tx1"/>
-                </a:solidFill>
-              </a:ln>
-            </p:spPr>
-            <p:style>
-              <a:lnRef idx="1">
-                <a:schemeClr val="dk1"/>
-              </a:lnRef>
-              <a:fillRef idx="0">
-                <a:schemeClr val="dk1"/>
-              </a:fillRef>
-              <a:effectRef idx="0">
-                <a:schemeClr val="dk1"/>
-              </a:effectRef>
-              <a:fontRef idx="minor">
-                <a:schemeClr val="tx1"/>
-              </a:fontRef>
-            </p:style>
-          </p:cxnSp>
-          <p:sp>
-            <p:nvSpPr>
-              <p:cNvPr id="64" name="Star: 10 Points 63">
-                <a:extLst>
-                  <a:ext uri="{FF2B5EF4-FFF2-40B4-BE49-F238E27FC236}">
-                    <a16:creationId xmlns:a16="http://schemas.microsoft.com/office/drawing/2014/main" id="{F2E37D50-4EB2-4D82-B9A0-BD0CCDFBB791}"/>
-                  </a:ext>
-                </a:extLst>
-              </p:cNvPr>
-              <p:cNvSpPr/>
-              <p:nvPr/>
-            </p:nvSpPr>
-            <p:spPr>
-              <a:xfrm>
-                <a:off x="10774250" y="1907970"/>
-                <a:ext cx="232611" cy="221698"/>
-              </a:xfrm>
-              <a:prstGeom prst="star10">
-                <a:avLst/>
-              </a:prstGeom>
-              <a:solidFill>
-                <a:schemeClr val="accent2"/>
-              </a:solidFill>
-              <a:ln>
-                <a:solidFill>
-                  <a:srgbClr val="C00000"/>
-                </a:solidFill>
-              </a:ln>
-            </p:spPr>
-            <p:style>
-              <a:lnRef idx="2">
-                <a:schemeClr val="accent1">
-                  <a:shade val="50000"/>
-                </a:schemeClr>
-              </a:lnRef>
-              <a:fillRef idx="1">
-                <a:schemeClr val="accent1"/>
-              </a:fillRef>
-              <a:effectRef idx="0">
-                <a:schemeClr val="accent1"/>
-              </a:effectRef>
-              <a:fontRef idx="minor">
-                <a:schemeClr val="lt1"/>
-              </a:fontRef>
-            </p:style>
-            <p:txBody>
-              <a:bodyPr rtlCol="0" anchor="ctr"/>
-              <a:lstStyle/>
-              <a:p>
-                <a:pPr algn="ctr"/>
-                <a:endParaRPr lang="en-US" sz="2942">
-                  <a:solidFill>
-                    <a:srgbClr val="FF0000"/>
-                  </a:solidFill>
-                </a:endParaRPr>
-              </a:p>
-            </p:txBody>
-          </p:sp>
-          <p:pic>
-            <p:nvPicPr>
-              <p:cNvPr id="65" name="Picture 64">
-                <a:extLst>
-                  <a:ext uri="{FF2B5EF4-FFF2-40B4-BE49-F238E27FC236}">
-                    <a16:creationId xmlns:a16="http://schemas.microsoft.com/office/drawing/2014/main" id="{BADBAF13-094D-4BD2-8B7C-065EB5F69441}"/>
-                  </a:ext>
-                </a:extLst>
-              </p:cNvPr>
-              <p:cNvPicPr>
-                <a:picLocks noChangeAspect="1"/>
-              </p:cNvPicPr>
-              <p:nvPr/>
-            </p:nvPicPr>
-            <p:blipFill>
-              <a:blip r:embed="rId7"/>
-              <a:stretch>
-                <a:fillRect/>
-              </a:stretch>
-            </p:blipFill>
-            <p:spPr>
-              <a:xfrm>
-                <a:off x="10062422" y="2056264"/>
-                <a:ext cx="371151" cy="510333"/>
-              </a:xfrm>
-              <a:prstGeom prst="rect">
-                <a:avLst/>
-              </a:prstGeom>
-            </p:spPr>
-          </p:pic>
-          <p:sp>
-            <p:nvSpPr>
-              <p:cNvPr id="36" name="TextBox 35">
-                <a:extLst>
-                  <a:ext uri="{FF2B5EF4-FFF2-40B4-BE49-F238E27FC236}">
-                    <a16:creationId xmlns:a16="http://schemas.microsoft.com/office/drawing/2014/main" id="{091C778E-4931-4C16-96B1-2FD7443C036F}"/>
-                  </a:ext>
-                </a:extLst>
-              </p:cNvPr>
-              <p:cNvSpPr txBox="1"/>
-              <p:nvPr/>
-            </p:nvSpPr>
-            <p:spPr>
-              <a:xfrm>
-                <a:off x="4536840" y="3493875"/>
-                <a:ext cx="1543602" cy="708137"/>
-              </a:xfrm>
-              <a:prstGeom prst="rect">
-                <a:avLst/>
-              </a:prstGeom>
-              <a:noFill/>
-            </p:spPr>
-            <p:txBody>
-              <a:bodyPr wrap="square" rtlCol="0">
-                <a:spAutoFit/>
-              </a:bodyPr>
-              <a:lstStyle/>
-              <a:p>
-                <a:pPr algn="ctr"/>
-                <a:r>
-                  <a:rPr lang="en-US" sz="2087" dirty="0"/>
-                  <a:t>Urban Waste Water Treatment Directive</a:t>
-                </a:r>
-              </a:p>
-            </p:txBody>
-          </p:sp>
-          <p:pic>
-            <p:nvPicPr>
-              <p:cNvPr id="31" name="Picture 30">
-                <a:extLst>
-                  <a:ext uri="{FF2B5EF4-FFF2-40B4-BE49-F238E27FC236}">
-                    <a16:creationId xmlns:a16="http://schemas.microsoft.com/office/drawing/2014/main" id="{4A9EAB7E-2F8F-40C8-B631-05A37B4FD5C0}"/>
-                  </a:ext>
-                </a:extLst>
-              </p:cNvPr>
-              <p:cNvPicPr>
-                <a:picLocks noChangeAspect="1"/>
-              </p:cNvPicPr>
-              <p:nvPr/>
-            </p:nvPicPr>
-            <p:blipFill>
-              <a:blip r:embed="rId8"/>
-              <a:stretch>
-                <a:fillRect/>
-              </a:stretch>
-            </p:blipFill>
-            <p:spPr>
-              <a:xfrm>
-                <a:off x="1947817" y="2208009"/>
-                <a:ext cx="820333" cy="682786"/>
-              </a:xfrm>
-              <a:prstGeom prst="rect">
-                <a:avLst/>
-              </a:prstGeom>
-            </p:spPr>
-          </p:pic>
-        </p:grpSp>
-        <p:sp>
-          <p:nvSpPr>
-            <p:cNvPr id="59" name="TextBox 58">
-              <a:extLst>
-                <a:ext uri="{FF2B5EF4-FFF2-40B4-BE49-F238E27FC236}">
-                  <a16:creationId xmlns:a16="http://schemas.microsoft.com/office/drawing/2014/main" id="{807C3D28-5ADF-416D-885D-E03D32D11485}"/>
-                </a:ext>
-              </a:extLst>
-            </p:cNvPr>
-            <p:cNvSpPr txBox="1"/>
-            <p:nvPr/>
-          </p:nvSpPr>
-          <p:spPr>
-            <a:xfrm rot="2668846">
-              <a:off x="4768405" y="2850864"/>
-              <a:ext cx="743939" cy="327583"/>
-            </a:xfrm>
-            <a:prstGeom prst="rect">
-              <a:avLst/>
-            </a:prstGeom>
-            <a:noFill/>
-          </p:spPr>
-          <p:txBody>
-            <a:bodyPr wrap="square" rtlCol="0">
-              <a:spAutoFit/>
-            </a:bodyPr>
-            <a:lstStyle/>
-            <a:p>
-              <a:r>
-                <a:rPr lang="en-US" sz="2386" dirty="0"/>
-                <a:t>1991</a:t>
-              </a:r>
-            </a:p>
-          </p:txBody>
-        </p:sp>
-        <p:cxnSp>
-          <p:nvCxnSpPr>
-            <p:cNvPr id="66" name="Straight Connector 65">
-              <a:extLst>
-                <a:ext uri="{FF2B5EF4-FFF2-40B4-BE49-F238E27FC236}">
-                  <a16:creationId xmlns:a16="http://schemas.microsoft.com/office/drawing/2014/main" id="{6039F87E-6CEE-4A6E-86F5-F7587FC0925E}"/>
-                </a:ext>
-              </a:extLst>
-            </p:cNvPr>
-            <p:cNvCxnSpPr>
-              <a:cxnSpLocks/>
-            </p:cNvCxnSpPr>
-            <p:nvPr/>
-          </p:nvCxnSpPr>
-          <p:spPr>
-            <a:xfrm flipV="1">
-              <a:off x="5301778" y="3226567"/>
-              <a:ext cx="436" cy="557467"/>
-            </a:xfrm>
-            <a:prstGeom prst="line">
-              <a:avLst/>
-            </a:prstGeom>
-            <a:ln w="25400">
-              <a:solidFill>
-                <a:schemeClr val="tx1"/>
-              </a:solidFill>
-            </a:ln>
-          </p:spPr>
-          <p:style>
-            <a:lnRef idx="1">
-              <a:schemeClr val="dk1"/>
-            </a:lnRef>
-            <a:fillRef idx="0">
-              <a:schemeClr val="dk1"/>
-            </a:fillRef>
-            <a:effectRef idx="0">
-              <a:schemeClr val="dk1"/>
-            </a:effectRef>
-            <a:fontRef idx="minor">
-              <a:schemeClr val="tx1"/>
-            </a:fontRef>
-          </p:style>
-        </p:cxnSp>
-        <p:sp>
-          <p:nvSpPr>
-            <p:cNvPr id="68" name="TextBox 67">
-              <a:extLst>
-                <a:ext uri="{FF2B5EF4-FFF2-40B4-BE49-F238E27FC236}">
-                  <a16:creationId xmlns:a16="http://schemas.microsoft.com/office/drawing/2014/main" id="{4620A308-98ED-42A2-92E4-8EC380F30E1E}"/>
-                </a:ext>
-              </a:extLst>
-            </p:cNvPr>
-            <p:cNvSpPr txBox="1"/>
-            <p:nvPr/>
-          </p:nvSpPr>
-          <p:spPr>
-            <a:xfrm rot="2668846">
-              <a:off x="6498894" y="2855936"/>
-              <a:ext cx="743939" cy="327583"/>
-            </a:xfrm>
-            <a:prstGeom prst="rect">
-              <a:avLst/>
-            </a:prstGeom>
-            <a:noFill/>
-          </p:spPr>
-          <p:txBody>
-            <a:bodyPr wrap="square" rtlCol="0">
-              <a:spAutoFit/>
-            </a:bodyPr>
-            <a:lstStyle/>
-            <a:p>
-              <a:r>
-                <a:rPr lang="en-US" sz="2386" dirty="0"/>
-                <a:t>2000</a:t>
-              </a:r>
-            </a:p>
-          </p:txBody>
-        </p:sp>
-        <p:cxnSp>
-          <p:nvCxnSpPr>
-            <p:cNvPr id="69" name="Straight Connector 68">
-              <a:extLst>
-                <a:ext uri="{FF2B5EF4-FFF2-40B4-BE49-F238E27FC236}">
-                  <a16:creationId xmlns:a16="http://schemas.microsoft.com/office/drawing/2014/main" id="{ED6940E5-9026-48C0-9FB0-D3CB7A61FE04}"/>
-                </a:ext>
-              </a:extLst>
-            </p:cNvPr>
-            <p:cNvCxnSpPr>
-              <a:cxnSpLocks/>
-            </p:cNvCxnSpPr>
-            <p:nvPr/>
-          </p:nvCxnSpPr>
-          <p:spPr>
-            <a:xfrm flipV="1">
-              <a:off x="7012052" y="3251962"/>
-              <a:ext cx="436" cy="557467"/>
-            </a:xfrm>
-            <a:prstGeom prst="line">
-              <a:avLst/>
-            </a:prstGeom>
-            <a:ln w="25400">
-              <a:solidFill>
-                <a:schemeClr val="tx1"/>
-              </a:solidFill>
-            </a:ln>
-          </p:spPr>
-          <p:style>
-            <a:lnRef idx="1">
-              <a:schemeClr val="dk1"/>
-            </a:lnRef>
-            <a:fillRef idx="0">
-              <a:schemeClr val="dk1"/>
-            </a:fillRef>
-            <a:effectRef idx="0">
-              <a:schemeClr val="dk1"/>
-            </a:effectRef>
-            <a:fontRef idx="minor">
-              <a:schemeClr val="tx1"/>
-            </a:fontRef>
-          </p:style>
-        </p:cxnSp>
-        <p:sp>
-          <p:nvSpPr>
-            <p:cNvPr id="70" name="TextBox 69">
-              <a:extLst>
-                <a:ext uri="{FF2B5EF4-FFF2-40B4-BE49-F238E27FC236}">
-                  <a16:creationId xmlns:a16="http://schemas.microsoft.com/office/drawing/2014/main" id="{956C83FE-6B78-4EE5-BDCF-FDDA550DA8BB}"/>
-                </a:ext>
-              </a:extLst>
-            </p:cNvPr>
-            <p:cNvSpPr txBox="1"/>
-            <p:nvPr/>
-          </p:nvSpPr>
-          <p:spPr>
-            <a:xfrm rot="2668846">
-              <a:off x="9539640" y="2832858"/>
-              <a:ext cx="743939" cy="327583"/>
-            </a:xfrm>
-            <a:prstGeom prst="rect">
-              <a:avLst/>
-            </a:prstGeom>
-            <a:noFill/>
-          </p:spPr>
-          <p:txBody>
-            <a:bodyPr wrap="square" rtlCol="0">
-              <a:spAutoFit/>
-            </a:bodyPr>
-            <a:lstStyle/>
-            <a:p>
-              <a:r>
-                <a:rPr lang="en-US" sz="2386" dirty="0"/>
-                <a:t>2016</a:t>
-              </a:r>
-            </a:p>
-          </p:txBody>
-        </p:sp>
-        <p:sp>
-          <p:nvSpPr>
-            <p:cNvPr id="71" name="TextBox 70">
-              <a:extLst>
-                <a:ext uri="{FF2B5EF4-FFF2-40B4-BE49-F238E27FC236}">
-                  <a16:creationId xmlns:a16="http://schemas.microsoft.com/office/drawing/2014/main" id="{04F5DEFD-49CE-41E2-8A40-12538C918C9D}"/>
-                </a:ext>
-              </a:extLst>
-            </p:cNvPr>
-            <p:cNvSpPr txBox="1"/>
-            <p:nvPr/>
-          </p:nvSpPr>
-          <p:spPr>
-            <a:xfrm rot="2668846">
-              <a:off x="9956711" y="2831944"/>
-              <a:ext cx="743939" cy="327583"/>
-            </a:xfrm>
-            <a:prstGeom prst="rect">
-              <a:avLst/>
-            </a:prstGeom>
-            <a:noFill/>
-          </p:spPr>
-          <p:txBody>
-            <a:bodyPr wrap="square" rtlCol="0">
-              <a:spAutoFit/>
-            </a:bodyPr>
-            <a:lstStyle/>
-            <a:p>
-              <a:r>
-                <a:rPr lang="en-US" sz="2386" dirty="0"/>
-                <a:t>2018</a:t>
-              </a:r>
-            </a:p>
-          </p:txBody>
-        </p:sp>
-        <p:cxnSp>
-          <p:nvCxnSpPr>
-            <p:cNvPr id="72" name="Straight Connector 71">
-              <a:extLst>
-                <a:ext uri="{FF2B5EF4-FFF2-40B4-BE49-F238E27FC236}">
-                  <a16:creationId xmlns:a16="http://schemas.microsoft.com/office/drawing/2014/main" id="{2B079FB0-BCEA-42EF-B415-6630F421A3F0}"/>
-                </a:ext>
-              </a:extLst>
-            </p:cNvPr>
-            <p:cNvCxnSpPr>
-              <a:cxnSpLocks/>
-            </p:cNvCxnSpPr>
-            <p:nvPr/>
-          </p:nvCxnSpPr>
-          <p:spPr>
-            <a:xfrm flipV="1">
-              <a:off x="10093755" y="3250837"/>
-              <a:ext cx="436" cy="557467"/>
-            </a:xfrm>
-            <a:prstGeom prst="line">
-              <a:avLst/>
-            </a:prstGeom>
-            <a:ln w="25400">
-              <a:solidFill>
-                <a:schemeClr val="tx1"/>
-              </a:solidFill>
-            </a:ln>
-          </p:spPr>
-          <p:style>
-            <a:lnRef idx="1">
-              <a:schemeClr val="dk1"/>
-            </a:lnRef>
-            <a:fillRef idx="0">
-              <a:schemeClr val="dk1"/>
-            </a:fillRef>
-            <a:effectRef idx="0">
-              <a:schemeClr val="dk1"/>
-            </a:effectRef>
-            <a:fontRef idx="minor">
-              <a:schemeClr val="tx1"/>
-            </a:fontRef>
-          </p:style>
-        </p:cxnSp>
-        <p:cxnSp>
-          <p:nvCxnSpPr>
-            <p:cNvPr id="73" name="Straight Connector 72">
-              <a:extLst>
-                <a:ext uri="{FF2B5EF4-FFF2-40B4-BE49-F238E27FC236}">
-                  <a16:creationId xmlns:a16="http://schemas.microsoft.com/office/drawing/2014/main" id="{0617B2B9-7EE4-41BE-A806-D6E6981F3EDD}"/>
-                </a:ext>
-              </a:extLst>
-            </p:cNvPr>
-            <p:cNvCxnSpPr>
-              <a:cxnSpLocks/>
-            </p:cNvCxnSpPr>
-            <p:nvPr/>
-          </p:nvCxnSpPr>
-          <p:spPr>
-            <a:xfrm flipV="1">
-              <a:off x="10468924" y="3234613"/>
-              <a:ext cx="436" cy="557467"/>
-            </a:xfrm>
-            <a:prstGeom prst="line">
-              <a:avLst/>
-            </a:prstGeom>
-            <a:ln w="25400">
-              <a:solidFill>
-                <a:schemeClr val="tx1"/>
-              </a:solidFill>
-            </a:ln>
-          </p:spPr>
-          <p:style>
-            <a:lnRef idx="1">
-              <a:schemeClr val="dk1"/>
-            </a:lnRef>
-            <a:fillRef idx="0">
-              <a:schemeClr val="dk1"/>
-            </a:fillRef>
-            <a:effectRef idx="0">
-              <a:schemeClr val="dk1"/>
-            </a:effectRef>
-            <a:fontRef idx="minor">
-              <a:schemeClr val="tx1"/>
-            </a:fontRef>
-          </p:style>
-        </p:cxnSp>
-      </p:grpSp>
-    </p:spTree>
-    <p:extLst>
-      <p:ext uri="{BB962C8B-B14F-4D97-AF65-F5344CB8AC3E}">
-        <p14:creationId xmlns:p14="http://schemas.microsoft.com/office/powerpoint/2010/main" val="379050956"/>
-      </p:ext>
-    </p:extLst>
-  </p:cSld>
-  <p:clrMapOvr>
-    <a:masterClrMapping/>
-  </p:clrMapOvr>
-</p:sld>
-</file>
-
-<file path=ppt/slides/slide3.xml><?xml version="1.0" encoding="utf-8"?>
 <p:sld xmlns:a="http://schemas.openxmlformats.org/drawingml/2006/main" xmlns:r="http://schemas.openxmlformats.org/officeDocument/2006/relationships" xmlns:p="http://schemas.openxmlformats.org/presentationml/2006/main">
   <p:cSld>
     <p:spTree>

</xml_diff>

<commit_message>
fixing back transformation and reformation figures for journal requirements
</commit_message>
<xml_diff>
--- a/plots/Fig1/Fig1_ppt.pptx
+++ b/plots/Fig1/Fig1_ppt.pptx
@@ -243,7 +243,7 @@
           <a:p>
             <a:fld id="{75959157-271F-4399-8FEB-EF56E6D5E496}" type="datetimeFigureOut">
               <a:rPr lang="en-US" smtClean="0"/>
-              <a:t>4/5/2023</a:t>
+              <a:t>4/29/2023</a:t>
             </a:fld>
             <a:endParaRPr lang="en-US"/>
           </a:p>
@@ -413,7 +413,7 @@
           <a:p>
             <a:fld id="{75959157-271F-4399-8FEB-EF56E6D5E496}" type="datetimeFigureOut">
               <a:rPr lang="en-US" smtClean="0"/>
-              <a:t>4/5/2023</a:t>
+              <a:t>4/29/2023</a:t>
             </a:fld>
             <a:endParaRPr lang="en-US"/>
           </a:p>
@@ -593,7 +593,7 @@
           <a:p>
             <a:fld id="{75959157-271F-4399-8FEB-EF56E6D5E496}" type="datetimeFigureOut">
               <a:rPr lang="en-US" smtClean="0"/>
-              <a:t>4/5/2023</a:t>
+              <a:t>4/29/2023</a:t>
             </a:fld>
             <a:endParaRPr lang="en-US"/>
           </a:p>
@@ -763,7 +763,7 @@
           <a:p>
             <a:fld id="{75959157-271F-4399-8FEB-EF56E6D5E496}" type="datetimeFigureOut">
               <a:rPr lang="en-US" smtClean="0"/>
-              <a:t>4/5/2023</a:t>
+              <a:t>4/29/2023</a:t>
             </a:fld>
             <a:endParaRPr lang="en-US"/>
           </a:p>
@@ -1007,7 +1007,7 @@
           <a:p>
             <a:fld id="{75959157-271F-4399-8FEB-EF56E6D5E496}" type="datetimeFigureOut">
               <a:rPr lang="en-US" smtClean="0"/>
-              <a:t>4/5/2023</a:t>
+              <a:t>4/29/2023</a:t>
             </a:fld>
             <a:endParaRPr lang="en-US"/>
           </a:p>
@@ -1239,7 +1239,7 @@
           <a:p>
             <a:fld id="{75959157-271F-4399-8FEB-EF56E6D5E496}" type="datetimeFigureOut">
               <a:rPr lang="en-US" smtClean="0"/>
-              <a:t>4/5/2023</a:t>
+              <a:t>4/29/2023</a:t>
             </a:fld>
             <a:endParaRPr lang="en-US"/>
           </a:p>
@@ -1606,7 +1606,7 @@
           <a:p>
             <a:fld id="{75959157-271F-4399-8FEB-EF56E6D5E496}" type="datetimeFigureOut">
               <a:rPr lang="en-US" smtClean="0"/>
-              <a:t>4/5/2023</a:t>
+              <a:t>4/29/2023</a:t>
             </a:fld>
             <a:endParaRPr lang="en-US"/>
           </a:p>
@@ -1724,7 +1724,7 @@
           <a:p>
             <a:fld id="{75959157-271F-4399-8FEB-EF56E6D5E496}" type="datetimeFigureOut">
               <a:rPr lang="en-US" smtClean="0"/>
-              <a:t>4/5/2023</a:t>
+              <a:t>4/29/2023</a:t>
             </a:fld>
             <a:endParaRPr lang="en-US"/>
           </a:p>
@@ -1819,7 +1819,7 @@
           <a:p>
             <a:fld id="{75959157-271F-4399-8FEB-EF56E6D5E496}" type="datetimeFigureOut">
               <a:rPr lang="en-US" smtClean="0"/>
-              <a:t>4/5/2023</a:t>
+              <a:t>4/29/2023</a:t>
             </a:fld>
             <a:endParaRPr lang="en-US"/>
           </a:p>
@@ -2096,7 +2096,7 @@
           <a:p>
             <a:fld id="{75959157-271F-4399-8FEB-EF56E6D5E496}" type="datetimeFigureOut">
               <a:rPr lang="en-US" smtClean="0"/>
-              <a:t>4/5/2023</a:t>
+              <a:t>4/29/2023</a:t>
             </a:fld>
             <a:endParaRPr lang="en-US"/>
           </a:p>
@@ -2353,7 +2353,7 @@
           <a:p>
             <a:fld id="{75959157-271F-4399-8FEB-EF56E6D5E496}" type="datetimeFigureOut">
               <a:rPr lang="en-US" smtClean="0"/>
-              <a:t>4/5/2023</a:t>
+              <a:t>4/29/2023</a:t>
             </a:fld>
             <a:endParaRPr lang="en-US"/>
           </a:p>
@@ -2566,7 +2566,7 @@
           <a:p>
             <a:fld id="{75959157-271F-4399-8FEB-EF56E6D5E496}" type="datetimeFigureOut">
               <a:rPr lang="en-US" smtClean="0"/>
-              <a:t>4/5/2023</a:t>
+              <a:t>4/29/2023</a:t>
             </a:fld>
             <a:endParaRPr lang="en-US"/>
           </a:p>
@@ -2973,10 +2973,10 @@
       </p:grpSpPr>
       <p:grpSp>
         <p:nvGrpSpPr>
-          <p:cNvPr id="49" name="Group 48">
+          <p:cNvPr id="26" name="Group 25">
             <a:extLst>
               <a:ext uri="{FF2B5EF4-FFF2-40B4-BE49-F238E27FC236}">
-                <a16:creationId xmlns:a16="http://schemas.microsoft.com/office/drawing/2014/main" id="{8C5C1BA1-D8D7-1118-5C4D-7AB6AD321DA8}"/>
+                <a16:creationId xmlns:a16="http://schemas.microsoft.com/office/drawing/2014/main" id="{2A5351A8-EF13-40EA-581F-6F70B55D7053}"/>
               </a:ext>
             </a:extLst>
           </p:cNvPr>
@@ -2985,9 +2985,9 @@
         </p:nvGrpSpPr>
         <p:grpSpPr>
           <a:xfrm>
-            <a:off x="1778925" y="796428"/>
+            <a:off x="1778925" y="746552"/>
             <a:ext cx="17523228" cy="12650194"/>
-            <a:chOff x="1778925" y="846304"/>
+            <a:chOff x="1778925" y="796428"/>
             <a:chExt cx="17523228" cy="12650194"/>
           </a:xfrm>
         </p:grpSpPr>
@@ -3005,7 +3005,7 @@
           </p:nvGrpSpPr>
           <p:grpSpPr>
             <a:xfrm>
-              <a:off x="1778925" y="846304"/>
+              <a:off x="1778925" y="796428"/>
               <a:ext cx="17523228" cy="12650194"/>
               <a:chOff x="2028307" y="1245316"/>
               <a:chExt cx="17523228" cy="12650194"/>
@@ -5435,7 +5435,7 @@
               </p:nvSpPr>
               <p:spPr>
                 <a:xfrm>
-                  <a:off x="12328384" y="1972522"/>
+                  <a:off x="12427498" y="1904422"/>
                   <a:ext cx="1382912" cy="1055866"/>
                 </a:xfrm>
                 <a:prstGeom prst="rect">
@@ -5657,10 +5657,10 @@
         </p:grpSp>
         <p:pic>
           <p:nvPicPr>
-            <p:cNvPr id="41" name="Picture 40">
+            <p:cNvPr id="6" name="Picture 5">
               <a:extLst>
                 <a:ext uri="{FF2B5EF4-FFF2-40B4-BE49-F238E27FC236}">
-                  <a16:creationId xmlns:a16="http://schemas.microsoft.com/office/drawing/2014/main" id="{3B208677-A979-B867-95F4-16F92D392A81}"/>
+                  <a16:creationId xmlns:a16="http://schemas.microsoft.com/office/drawing/2014/main" id="{E370BE13-24E0-7658-18A4-5A963ED4A8E7}"/>
                 </a:ext>
               </a:extLst>
             </p:cNvPr>
@@ -5683,8 +5683,8 @@
           </p:blipFill>
           <p:spPr>
             <a:xfrm>
-              <a:off x="2978134" y="4538268"/>
-              <a:ext cx="10103907" cy="8660492"/>
+              <a:off x="2988429" y="4289163"/>
+              <a:ext cx="10226812" cy="8765839"/>
             </a:xfrm>
             <a:prstGeom prst="rect">
               <a:avLst/>
@@ -5693,10 +5693,10 @@
         </p:pic>
         <p:sp>
           <p:nvSpPr>
-            <p:cNvPr id="48" name="TextBox 47">
+            <p:cNvPr id="24" name="TextBox 23">
               <a:extLst>
                 <a:ext uri="{FF2B5EF4-FFF2-40B4-BE49-F238E27FC236}">
-                  <a16:creationId xmlns:a16="http://schemas.microsoft.com/office/drawing/2014/main" id="{4075F8F8-4A52-8420-9F61-EFD097A33449}"/>
+                  <a16:creationId xmlns:a16="http://schemas.microsoft.com/office/drawing/2014/main" id="{9CF08437-36D3-A041-68C6-1EEB3D387C45}"/>
                 </a:ext>
               </a:extLst>
             </p:cNvPr>
@@ -5705,8 +5705,8 @@
           </p:nvSpPr>
           <p:spPr>
             <a:xfrm>
-              <a:off x="3305181" y="4538626"/>
-              <a:ext cx="3857022" cy="800219"/>
+              <a:off x="3207791" y="4301316"/>
+              <a:ext cx="3610379" cy="523220"/>
             </a:xfrm>
             <a:prstGeom prst="rect">
               <a:avLst/>
@@ -5743,9 +5743,6 @@
                 </a:rPr>
                 <a:t>)</a:t>
               </a:r>
-            </a:p>
-            <a:p>
-              <a:endParaRPr lang="en-US" dirty="0"/>
             </a:p>
           </p:txBody>
         </p:sp>

</xml_diff>

<commit_message>
Moving plot locations and adding published paper citation
</commit_message>
<xml_diff>
--- a/plots/Fig1/Fig1_ppt.pptx
+++ b/plots/Fig1/Fig1_ppt.pptx
@@ -243,7 +243,7 @@
           <a:p>
             <a:fld id="{75959157-271F-4399-8FEB-EF56E6D5E496}" type="datetimeFigureOut">
               <a:rPr lang="en-US" smtClean="0"/>
-              <a:t>7/3/2023</a:t>
+              <a:t>7/14/2023</a:t>
             </a:fld>
             <a:endParaRPr lang="en-US"/>
           </a:p>
@@ -413,7 +413,7 @@
           <a:p>
             <a:fld id="{75959157-271F-4399-8FEB-EF56E6D5E496}" type="datetimeFigureOut">
               <a:rPr lang="en-US" smtClean="0"/>
-              <a:t>7/3/2023</a:t>
+              <a:t>7/14/2023</a:t>
             </a:fld>
             <a:endParaRPr lang="en-US"/>
           </a:p>
@@ -593,7 +593,7 @@
           <a:p>
             <a:fld id="{75959157-271F-4399-8FEB-EF56E6D5E496}" type="datetimeFigureOut">
               <a:rPr lang="en-US" smtClean="0"/>
-              <a:t>7/3/2023</a:t>
+              <a:t>7/14/2023</a:t>
             </a:fld>
             <a:endParaRPr lang="en-US"/>
           </a:p>
@@ -763,7 +763,7 @@
           <a:p>
             <a:fld id="{75959157-271F-4399-8FEB-EF56E6D5E496}" type="datetimeFigureOut">
               <a:rPr lang="en-US" smtClean="0"/>
-              <a:t>7/3/2023</a:t>
+              <a:t>7/14/2023</a:t>
             </a:fld>
             <a:endParaRPr lang="en-US"/>
           </a:p>
@@ -1007,7 +1007,7 @@
           <a:p>
             <a:fld id="{75959157-271F-4399-8FEB-EF56E6D5E496}" type="datetimeFigureOut">
               <a:rPr lang="en-US" smtClean="0"/>
-              <a:t>7/3/2023</a:t>
+              <a:t>7/14/2023</a:t>
             </a:fld>
             <a:endParaRPr lang="en-US"/>
           </a:p>
@@ -1239,7 +1239,7 @@
           <a:p>
             <a:fld id="{75959157-271F-4399-8FEB-EF56E6D5E496}" type="datetimeFigureOut">
               <a:rPr lang="en-US" smtClean="0"/>
-              <a:t>7/3/2023</a:t>
+              <a:t>7/14/2023</a:t>
             </a:fld>
             <a:endParaRPr lang="en-US"/>
           </a:p>
@@ -1606,7 +1606,7 @@
           <a:p>
             <a:fld id="{75959157-271F-4399-8FEB-EF56E6D5E496}" type="datetimeFigureOut">
               <a:rPr lang="en-US" smtClean="0"/>
-              <a:t>7/3/2023</a:t>
+              <a:t>7/14/2023</a:t>
             </a:fld>
             <a:endParaRPr lang="en-US"/>
           </a:p>
@@ -1724,7 +1724,7 @@
           <a:p>
             <a:fld id="{75959157-271F-4399-8FEB-EF56E6D5E496}" type="datetimeFigureOut">
               <a:rPr lang="en-US" smtClean="0"/>
-              <a:t>7/3/2023</a:t>
+              <a:t>7/14/2023</a:t>
             </a:fld>
             <a:endParaRPr lang="en-US"/>
           </a:p>
@@ -1819,7 +1819,7 @@
           <a:p>
             <a:fld id="{75959157-271F-4399-8FEB-EF56E6D5E496}" type="datetimeFigureOut">
               <a:rPr lang="en-US" smtClean="0"/>
-              <a:t>7/3/2023</a:t>
+              <a:t>7/14/2023</a:t>
             </a:fld>
             <a:endParaRPr lang="en-US"/>
           </a:p>
@@ -2096,7 +2096,7 @@
           <a:p>
             <a:fld id="{75959157-271F-4399-8FEB-EF56E6D5E496}" type="datetimeFigureOut">
               <a:rPr lang="en-US" smtClean="0"/>
-              <a:t>7/3/2023</a:t>
+              <a:t>7/14/2023</a:t>
             </a:fld>
             <a:endParaRPr lang="en-US"/>
           </a:p>
@@ -2353,7 +2353,7 @@
           <a:p>
             <a:fld id="{75959157-271F-4399-8FEB-EF56E6D5E496}" type="datetimeFigureOut">
               <a:rPr lang="en-US" smtClean="0"/>
-              <a:t>7/3/2023</a:t>
+              <a:t>7/14/2023</a:t>
             </a:fld>
             <a:endParaRPr lang="en-US"/>
           </a:p>
@@ -2566,7 +2566,7 @@
           <a:p>
             <a:fld id="{75959157-271F-4399-8FEB-EF56E6D5E496}" type="datetimeFigureOut">
               <a:rPr lang="en-US" smtClean="0"/>
-              <a:t>7/3/2023</a:t>
+              <a:t>7/14/2023</a:t>
             </a:fld>
             <a:endParaRPr lang="en-US"/>
           </a:p>
@@ -2985,7 +2985,7 @@
         </p:nvGrpSpPr>
         <p:grpSpPr>
           <a:xfrm>
-            <a:off x="1778925" y="563672"/>
+            <a:off x="1778925" y="513795"/>
             <a:ext cx="17523228" cy="12650194"/>
             <a:chOff x="1778925" y="796428"/>
             <a:chExt cx="17523228" cy="12650194"/>
@@ -5201,8 +5201,8 @@
               </p:nvSpPr>
               <p:spPr>
                 <a:xfrm>
-                  <a:off x="2725510" y="4957542"/>
-                  <a:ext cx="880442" cy="696666"/>
+                  <a:off x="2559260" y="4953286"/>
+                  <a:ext cx="880442" cy="769441"/>
                 </a:xfrm>
                 <a:prstGeom prst="rect">
                   <a:avLst/>
@@ -5216,7 +5216,7 @@
                 <a:lstStyle/>
                 <a:p>
                   <a:r>
-                    <a:rPr lang="en-US" sz="3927" dirty="0">
+                    <a:rPr lang="en-US" sz="4400" b="1" dirty="0">
                       <a:latin typeface="Arial" panose="020B0604020202020204" pitchFamily="34" charset="0"/>
                       <a:cs typeface="Arial" panose="020B0604020202020204" pitchFamily="34" charset="0"/>
                     </a:rPr>
@@ -5239,8 +5239,8 @@
               </p:nvSpPr>
               <p:spPr>
                 <a:xfrm>
-                  <a:off x="2657590" y="1500331"/>
-                  <a:ext cx="880442" cy="696666"/>
+                  <a:off x="2561135" y="1452317"/>
+                  <a:ext cx="880442" cy="769441"/>
                 </a:xfrm>
                 <a:prstGeom prst="rect">
                   <a:avLst/>
@@ -5254,7 +5254,7 @@
                 <a:lstStyle/>
                 <a:p>
                   <a:r>
-                    <a:rPr lang="en-US" sz="3927" dirty="0">
+                    <a:rPr lang="en-US" sz="4400" b="1" dirty="0">
                       <a:latin typeface="Arial" panose="020B0604020202020204" pitchFamily="34" charset="0"/>
                       <a:cs typeface="Arial" panose="020B0604020202020204" pitchFamily="34" charset="0"/>
                     </a:rPr>
@@ -5536,7 +5536,7 @@
               <p:spPr>
                 <a:xfrm>
                   <a:off x="13513441" y="4952863"/>
-                  <a:ext cx="880442" cy="696666"/>
+                  <a:ext cx="880442" cy="769441"/>
                 </a:xfrm>
                 <a:prstGeom prst="rect">
                   <a:avLst/>
@@ -5550,7 +5550,7 @@
                 <a:lstStyle/>
                 <a:p>
                   <a:r>
-                    <a:rPr lang="en-US" sz="3927" dirty="0">
+                    <a:rPr lang="en-US" sz="4400" b="1" dirty="0">
                       <a:latin typeface="Arial" panose="020B0604020202020204" pitchFamily="34" charset="0"/>
                       <a:cs typeface="Arial" panose="020B0604020202020204" pitchFamily="34" charset="0"/>
                     </a:rPr>

</xml_diff>